<commit_message>
文档 by qiyu 2022-06-20
</commit_message>
<xml_diff>
--- a/doc/zzdb.pptx
+++ b/doc/zzdb.pptx
@@ -39,7 +39,7 @@
 </p:cmAuthorLst>
 </file>
 
-<file path=ppt/charts/chart20.xml><?xml version="1.0" encoding="utf-8"?>
+<file path=ppt/charts/chart2.xml><?xml version="1.0" encoding="utf-8"?>
 <c:chartSpace xmlns:c="http://schemas.openxmlformats.org/drawingml/2006/chart" xmlns:a="http://schemas.openxmlformats.org/drawingml/2006/main" xmlns:r="http://schemas.openxmlformats.org/officeDocument/2006/relationships">
   <c:lang val="en-US"/>
   <c:roundedCorners val="0"/>
@@ -372,11 +372,11 @@
           </c:spPr>
         </c:hiLowLines>
         <c:marker val="1"/>
-        <c:axId val="8880380"/>
-        <c:axId val="93577480"/>
+        <c:axId val="80183367"/>
+        <c:axId val="76"/>
       </c:lineChart>
       <c:catAx>
-        <c:axId val="8880380"/>
+        <c:axId val="80183367"/>
         <c:scaling>
           <c:orientation val="minMax"/>
         </c:scaling>
@@ -413,14 +413,14 @@
             </a:pPr>
           </a:p>
         </c:txPr>
-        <c:crossAx val="93577480"/>
+        <c:crossAx val="76"/>
         <c:crosses val="autoZero"/>
         <c:auto val="1"/>
         <c:lblAlgn val="ctr"/>
         <c:lblOffset val="100"/>
       </c:catAx>
       <c:valAx>
-        <c:axId val="93577480"/>
+        <c:axId val="76"/>
         <c:scaling>
           <c:orientation val="minMax"/>
         </c:scaling>
@@ -464,7 +464,7 @@
             </a:pPr>
           </a:p>
         </c:txPr>
-        <c:crossAx val="8880380"/>
+        <c:crossAx val="80183367"/>
         <c:crosses val="autoZero"/>
         <c:crossBetween val="midCat"/>
       </c:valAx>
@@ -747,7 +747,7 @@
           <a:bodyPr lIns="0" rIns="0" tIns="0" bIns="0" anchor="b"/>
           <a:p>
             <a:pPr algn="r"/>
-            <a:fld id="{D0B07676-3DF1-454D-A069-AD2CB1A74AA5}" type="slidenum">
+            <a:fld id="{ED0DBACA-9D31-4FA3-84DB-363875F92886}" type="slidenum">
               <a:rPr b="0" lang="en-US" sz="1400" spc="-1" strike="noStrike">
                 <a:solidFill>
                   <a:srgbClr val="000000"/>
@@ -811,7 +811,7 @@
         <p:spPr>
           <a:xfrm>
             <a:off x="685800" y="4400640"/>
-            <a:ext cx="5484960" cy="3598920"/>
+            <a:ext cx="5484600" cy="3598560"/>
           </a:xfrm>
           <a:prstGeom prst="rect">
             <a:avLst/>
@@ -843,7 +843,7 @@
         <p:spPr>
           <a:xfrm>
             <a:off x="3884760" y="8685360"/>
-            <a:ext cx="2970360" cy="457200"/>
+            <a:ext cx="2970000" cy="456840"/>
           </a:xfrm>
           <a:prstGeom prst="rect">
             <a:avLst/>
@@ -895,7 +895,7 @@
         <p:spPr>
           <a:xfrm>
             <a:off x="685800" y="4400640"/>
-            <a:ext cx="5484960" cy="3598920"/>
+            <a:ext cx="5484600" cy="3598560"/>
           </a:xfrm>
           <a:prstGeom prst="rect">
             <a:avLst/>
@@ -927,7 +927,7 @@
         <p:spPr>
           <a:xfrm>
             <a:off x="3884760" y="8685360"/>
-            <a:ext cx="2970360" cy="457200"/>
+            <a:ext cx="2970000" cy="456840"/>
           </a:xfrm>
           <a:prstGeom prst="rect">
             <a:avLst/>
@@ -979,7 +979,7 @@
         <p:spPr>
           <a:xfrm>
             <a:off x="685800" y="4400640"/>
-            <a:ext cx="5484960" cy="3598920"/>
+            <a:ext cx="5484600" cy="3598560"/>
           </a:xfrm>
           <a:prstGeom prst="rect">
             <a:avLst/>
@@ -1011,7 +1011,7 @@
         <p:spPr>
           <a:xfrm>
             <a:off x="3884760" y="8685360"/>
-            <a:ext cx="2970360" cy="457200"/>
+            <a:ext cx="2970000" cy="456840"/>
           </a:xfrm>
           <a:prstGeom prst="rect">
             <a:avLst/>
@@ -1063,7 +1063,7 @@
         <p:spPr>
           <a:xfrm>
             <a:off x="685800" y="4400640"/>
-            <a:ext cx="5484960" cy="3598920"/>
+            <a:ext cx="5484600" cy="3598560"/>
           </a:xfrm>
           <a:prstGeom prst="rect">
             <a:avLst/>
@@ -1095,7 +1095,7 @@
         <p:spPr>
           <a:xfrm>
             <a:off x="3884760" y="8685360"/>
-            <a:ext cx="2970360" cy="457200"/>
+            <a:ext cx="2970000" cy="456840"/>
           </a:xfrm>
           <a:prstGeom prst="rect">
             <a:avLst/>
@@ -1147,7 +1147,7 @@
         <p:spPr>
           <a:xfrm>
             <a:off x="685800" y="4400640"/>
-            <a:ext cx="5484960" cy="3598920"/>
+            <a:ext cx="5484600" cy="3598560"/>
           </a:xfrm>
           <a:prstGeom prst="rect">
             <a:avLst/>
@@ -1179,7 +1179,7 @@
         <p:spPr>
           <a:xfrm>
             <a:off x="3884760" y="8685360"/>
-            <a:ext cx="2970360" cy="457200"/>
+            <a:ext cx="2970000" cy="456840"/>
           </a:xfrm>
           <a:prstGeom prst="rect">
             <a:avLst/>
@@ -1231,7 +1231,7 @@
         <p:spPr>
           <a:xfrm>
             <a:off x="685800" y="4400640"/>
-            <a:ext cx="5484960" cy="3598920"/>
+            <a:ext cx="5484600" cy="3598560"/>
           </a:xfrm>
           <a:prstGeom prst="rect">
             <a:avLst/>
@@ -1263,7 +1263,7 @@
         <p:spPr>
           <a:xfrm>
             <a:off x="3884760" y="8685360"/>
-            <a:ext cx="2970360" cy="457200"/>
+            <a:ext cx="2970000" cy="456840"/>
           </a:xfrm>
           <a:prstGeom prst="rect">
             <a:avLst/>
@@ -1315,7 +1315,7 @@
         <p:spPr>
           <a:xfrm>
             <a:off x="685800" y="4400640"/>
-            <a:ext cx="5484960" cy="3598920"/>
+            <a:ext cx="5484600" cy="3598560"/>
           </a:xfrm>
           <a:prstGeom prst="rect">
             <a:avLst/>
@@ -1347,7 +1347,7 @@
         <p:spPr>
           <a:xfrm>
             <a:off x="3884760" y="8685360"/>
-            <a:ext cx="2970360" cy="457200"/>
+            <a:ext cx="2970000" cy="456840"/>
           </a:xfrm>
           <a:prstGeom prst="rect">
             <a:avLst/>
@@ -1399,7 +1399,7 @@
         <p:spPr>
           <a:xfrm>
             <a:off x="685800" y="4400640"/>
-            <a:ext cx="5484960" cy="3598920"/>
+            <a:ext cx="5484600" cy="3598560"/>
           </a:xfrm>
           <a:prstGeom prst="rect">
             <a:avLst/>
@@ -1431,7 +1431,7 @@
         <p:spPr>
           <a:xfrm>
             <a:off x="3884760" y="8685360"/>
-            <a:ext cx="2970360" cy="457200"/>
+            <a:ext cx="2970000" cy="456840"/>
           </a:xfrm>
           <a:prstGeom prst="rect">
             <a:avLst/>
@@ -1483,7 +1483,7 @@
         <p:spPr>
           <a:xfrm>
             <a:off x="685800" y="4400640"/>
-            <a:ext cx="5484960" cy="3598920"/>
+            <a:ext cx="5484600" cy="3598560"/>
           </a:xfrm>
           <a:prstGeom prst="rect">
             <a:avLst/>
@@ -1515,7 +1515,7 @@
         <p:spPr>
           <a:xfrm>
             <a:off x="3884760" y="8685360"/>
-            <a:ext cx="2970360" cy="457200"/>
+            <a:ext cx="2970000" cy="456840"/>
           </a:xfrm>
           <a:prstGeom prst="rect">
             <a:avLst/>
@@ -1567,7 +1567,7 @@
         <p:spPr>
           <a:xfrm>
             <a:off x="685800" y="4400640"/>
-            <a:ext cx="5484960" cy="3598920"/>
+            <a:ext cx="5484600" cy="3598560"/>
           </a:xfrm>
           <a:prstGeom prst="rect">
             <a:avLst/>
@@ -1599,7 +1599,7 @@
         <p:spPr>
           <a:xfrm>
             <a:off x="3884760" y="8685360"/>
-            <a:ext cx="2970360" cy="457200"/>
+            <a:ext cx="2970000" cy="456840"/>
           </a:xfrm>
           <a:prstGeom prst="rect">
             <a:avLst/>
@@ -1651,7 +1651,7 @@
         <p:spPr>
           <a:xfrm>
             <a:off x="685800" y="4400640"/>
-            <a:ext cx="5484960" cy="3598920"/>
+            <a:ext cx="5484600" cy="3598560"/>
           </a:xfrm>
           <a:prstGeom prst="rect">
             <a:avLst/>
@@ -1683,7 +1683,7 @@
         <p:spPr>
           <a:xfrm>
             <a:off x="3884760" y="8685360"/>
-            <a:ext cx="2970360" cy="457200"/>
+            <a:ext cx="2970000" cy="456840"/>
           </a:xfrm>
           <a:prstGeom prst="rect">
             <a:avLst/>
@@ -1735,7 +1735,7 @@
         <p:spPr>
           <a:xfrm>
             <a:off x="685800" y="4400640"/>
-            <a:ext cx="5484960" cy="3598920"/>
+            <a:ext cx="5484600" cy="3598560"/>
           </a:xfrm>
           <a:prstGeom prst="rect">
             <a:avLst/>
@@ -1767,7 +1767,7 @@
         <p:spPr>
           <a:xfrm>
             <a:off x="3884760" y="8685360"/>
-            <a:ext cx="2970360" cy="457200"/>
+            <a:ext cx="2970000" cy="456840"/>
           </a:xfrm>
           <a:prstGeom prst="rect">
             <a:avLst/>
@@ -1819,7 +1819,7 @@
         <p:spPr>
           <a:xfrm>
             <a:off x="685800" y="4400640"/>
-            <a:ext cx="5484960" cy="3598920"/>
+            <a:ext cx="5484600" cy="3598560"/>
           </a:xfrm>
           <a:prstGeom prst="rect">
             <a:avLst/>
@@ -1851,7 +1851,7 @@
         <p:spPr>
           <a:xfrm>
             <a:off x="3884760" y="8685360"/>
-            <a:ext cx="2970360" cy="457200"/>
+            <a:ext cx="2970000" cy="456840"/>
           </a:xfrm>
           <a:prstGeom prst="rect">
             <a:avLst/>
@@ -1903,7 +1903,7 @@
         <p:spPr>
           <a:xfrm>
             <a:off x="685800" y="4400640"/>
-            <a:ext cx="5484960" cy="3598920"/>
+            <a:ext cx="5484600" cy="3598560"/>
           </a:xfrm>
           <a:prstGeom prst="rect">
             <a:avLst/>
@@ -1935,7 +1935,7 @@
         <p:spPr>
           <a:xfrm>
             <a:off x="3884760" y="8685360"/>
-            <a:ext cx="2970360" cy="457200"/>
+            <a:ext cx="2970000" cy="456840"/>
           </a:xfrm>
           <a:prstGeom prst="rect">
             <a:avLst/>
@@ -1987,7 +1987,7 @@
         <p:spPr>
           <a:xfrm>
             <a:off x="685800" y="4400640"/>
-            <a:ext cx="5484960" cy="3598920"/>
+            <a:ext cx="5484600" cy="3598560"/>
           </a:xfrm>
           <a:prstGeom prst="rect">
             <a:avLst/>
@@ -2019,7 +2019,7 @@
         <p:spPr>
           <a:xfrm>
             <a:off x="3884760" y="8685360"/>
-            <a:ext cx="2970360" cy="457200"/>
+            <a:ext cx="2970000" cy="456840"/>
           </a:xfrm>
           <a:prstGeom prst="rect">
             <a:avLst/>
@@ -2071,7 +2071,7 @@
         <p:spPr>
           <a:xfrm>
             <a:off x="685800" y="4400640"/>
-            <a:ext cx="5484960" cy="3598920"/>
+            <a:ext cx="5484600" cy="3598560"/>
           </a:xfrm>
           <a:prstGeom prst="rect">
             <a:avLst/>
@@ -2103,7 +2103,7 @@
         <p:spPr>
           <a:xfrm>
             <a:off x="3884760" y="8685360"/>
-            <a:ext cx="2970360" cy="457200"/>
+            <a:ext cx="2970000" cy="456840"/>
           </a:xfrm>
           <a:prstGeom prst="rect">
             <a:avLst/>
@@ -2155,7 +2155,7 @@
         <p:spPr>
           <a:xfrm>
             <a:off x="685800" y="4400640"/>
-            <a:ext cx="5484960" cy="3598920"/>
+            <a:ext cx="5484600" cy="3598560"/>
           </a:xfrm>
           <a:prstGeom prst="rect">
             <a:avLst/>
@@ -2187,7 +2187,7 @@
         <p:spPr>
           <a:xfrm>
             <a:off x="3884760" y="8685360"/>
-            <a:ext cx="2970360" cy="457200"/>
+            <a:ext cx="2970000" cy="456840"/>
           </a:xfrm>
           <a:prstGeom prst="rect">
             <a:avLst/>
@@ -5909,7 +5909,7 @@
         <p:spPr>
           <a:xfrm>
             <a:off x="0" y="0"/>
-            <a:ext cx="12190680" cy="3528000"/>
+            <a:ext cx="12190320" cy="3527640"/>
           </a:xfrm>
           <a:prstGeom prst="rect">
             <a:avLst/>
@@ -5949,7 +5949,7 @@
         <p:spPr>
           <a:xfrm>
             <a:off x="1066680" y="345960"/>
-            <a:ext cx="10056960" cy="5085720"/>
+            <a:ext cx="10056600" cy="5085360"/>
           </a:xfrm>
           <a:prstGeom prst="rect">
             <a:avLst/>
@@ -5968,7 +5968,7 @@
         <p:spPr>
           <a:xfrm rot="21595200">
             <a:off x="2160" y="2990880"/>
-            <a:ext cx="12191040" cy="3333960"/>
+            <a:ext cx="12190680" cy="3333600"/>
           </a:xfrm>
           <a:prstGeom prst="rect">
             <a:avLst/>
@@ -6004,7 +6004,7 @@
         <p:spPr>
           <a:xfrm>
             <a:off x="2207160" y="3845880"/>
-            <a:ext cx="1139760" cy="1139760"/>
+            <a:ext cx="1139400" cy="1139400"/>
           </a:xfrm>
           <a:prstGeom prst="rect">
             <a:avLst/>
@@ -6017,7 +6017,7 @@
               </a:schemeClr>
             </a:solidFill>
             <a:custDash>
-              <a:ds d="3300000" sp="100000"/>
+              <a:ds d="6400000" sp="100000"/>
             </a:custDash>
             <a:round/>
           </a:ln>
@@ -6058,7 +6058,7 @@
               </a:schemeClr>
             </a:solidFill>
             <a:custDash>
-              <a:ds d="1000000" sp="100000"/>
+              <a:ds d="1300000" sp="100000"/>
             </a:custDash>
             <a:round/>
           </a:ln>
@@ -6097,7 +6097,7 @@
               </a:schemeClr>
             </a:solidFill>
             <a:custDash>
-              <a:ds d="1000000" sp="100000"/>
+              <a:ds d="1300000" sp="100000"/>
             </a:custDash>
             <a:round/>
           </a:ln>
@@ -6124,7 +6124,7 @@
         <p:spPr>
           <a:xfrm>
             <a:off x="3534480" y="3845880"/>
-            <a:ext cx="1139760" cy="1139760"/>
+            <a:ext cx="1139400" cy="1139400"/>
           </a:xfrm>
           <a:prstGeom prst="rect">
             <a:avLst/>
@@ -6137,7 +6137,7 @@
               </a:schemeClr>
             </a:solidFill>
             <a:custDash>
-              <a:ds d="3300000" sp="100000"/>
+              <a:ds d="6400000" sp="100000"/>
             </a:custDash>
             <a:round/>
           </a:ln>
@@ -6178,7 +6178,7 @@
               </a:schemeClr>
             </a:solidFill>
             <a:custDash>
-              <a:ds d="1000000" sp="100000"/>
+              <a:ds d="1300000" sp="100000"/>
             </a:custDash>
             <a:round/>
           </a:ln>
@@ -6217,7 +6217,7 @@
               </a:schemeClr>
             </a:solidFill>
             <a:custDash>
-              <a:ds d="1000000" sp="100000"/>
+              <a:ds d="1300000" sp="100000"/>
             </a:custDash>
             <a:round/>
           </a:ln>
@@ -6244,7 +6244,7 @@
         <p:spPr>
           <a:xfrm>
             <a:off x="4861800" y="3845880"/>
-            <a:ext cx="1139760" cy="1139760"/>
+            <a:ext cx="1139400" cy="1139400"/>
           </a:xfrm>
           <a:prstGeom prst="rect">
             <a:avLst/>
@@ -6257,7 +6257,7 @@
               </a:schemeClr>
             </a:solidFill>
             <a:custDash>
-              <a:ds d="3300000" sp="100000"/>
+              <a:ds d="6400000" sp="100000"/>
             </a:custDash>
             <a:round/>
           </a:ln>
@@ -6298,7 +6298,7 @@
               </a:schemeClr>
             </a:solidFill>
             <a:custDash>
-              <a:ds d="1000000" sp="100000"/>
+              <a:ds d="1300000" sp="100000"/>
             </a:custDash>
             <a:round/>
           </a:ln>
@@ -6337,7 +6337,7 @@
               </a:schemeClr>
             </a:solidFill>
             <a:custDash>
-              <a:ds d="1000000" sp="100000"/>
+              <a:ds d="1300000" sp="100000"/>
             </a:custDash>
             <a:round/>
           </a:ln>
@@ -6364,7 +6364,7 @@
         <p:spPr>
           <a:xfrm>
             <a:off x="6189120" y="3845880"/>
-            <a:ext cx="1139760" cy="1139760"/>
+            <a:ext cx="1139400" cy="1139400"/>
           </a:xfrm>
           <a:prstGeom prst="rect">
             <a:avLst/>
@@ -6377,7 +6377,7 @@
               </a:schemeClr>
             </a:solidFill>
             <a:custDash>
-              <a:ds d="3300000" sp="100000"/>
+              <a:ds d="6400000" sp="100000"/>
             </a:custDash>
             <a:round/>
           </a:ln>
@@ -6418,7 +6418,7 @@
               </a:schemeClr>
             </a:solidFill>
             <a:custDash>
-              <a:ds d="1000000" sp="100000"/>
+              <a:ds d="1300000" sp="100000"/>
             </a:custDash>
             <a:round/>
           </a:ln>
@@ -6457,7 +6457,7 @@
               </a:schemeClr>
             </a:solidFill>
             <a:custDash>
-              <a:ds d="1000000" sp="100000"/>
+              <a:ds d="1300000" sp="100000"/>
             </a:custDash>
             <a:round/>
           </a:ln>
@@ -6484,7 +6484,7 @@
         <p:spPr>
           <a:xfrm>
             <a:off x="7516440" y="3845880"/>
-            <a:ext cx="1139760" cy="1139760"/>
+            <a:ext cx="1139400" cy="1139400"/>
           </a:xfrm>
           <a:prstGeom prst="rect">
             <a:avLst/>
@@ -6497,7 +6497,7 @@
               </a:schemeClr>
             </a:solidFill>
             <a:custDash>
-              <a:ds d="3300000" sp="100000"/>
+              <a:ds d="6400000" sp="100000"/>
             </a:custDash>
             <a:round/>
           </a:ln>
@@ -6538,7 +6538,7 @@
               </a:schemeClr>
             </a:solidFill>
             <a:custDash>
-              <a:ds d="1000000" sp="100000"/>
+              <a:ds d="1300000" sp="100000"/>
             </a:custDash>
             <a:round/>
           </a:ln>
@@ -6577,7 +6577,7 @@
               </a:schemeClr>
             </a:solidFill>
             <a:custDash>
-              <a:ds d="1000000" sp="100000"/>
+              <a:ds d="1300000" sp="100000"/>
             </a:custDash>
             <a:round/>
           </a:ln>
@@ -6604,7 +6604,7 @@
         <p:spPr>
           <a:xfrm>
             <a:off x="8843760" y="3845880"/>
-            <a:ext cx="1139760" cy="1139760"/>
+            <a:ext cx="1139400" cy="1139400"/>
           </a:xfrm>
           <a:prstGeom prst="rect">
             <a:avLst/>
@@ -6617,7 +6617,7 @@
               </a:schemeClr>
             </a:solidFill>
             <a:custDash>
-              <a:ds d="3300000" sp="100000"/>
+              <a:ds d="6400000" sp="100000"/>
             </a:custDash>
             <a:round/>
           </a:ln>
@@ -6658,7 +6658,7 @@
               </a:schemeClr>
             </a:solidFill>
             <a:custDash>
-              <a:ds d="1000000" sp="100000"/>
+              <a:ds d="1300000" sp="100000"/>
             </a:custDash>
             <a:round/>
           </a:ln>
@@ -6697,7 +6697,7 @@
               </a:schemeClr>
             </a:solidFill>
             <a:custDash>
-              <a:ds d="1000000" sp="100000"/>
+              <a:ds d="1300000" sp="100000"/>
             </a:custDash>
             <a:round/>
           </a:ln>
@@ -6723,8 +6723,8 @@
         </p:nvSpPr>
         <p:spPr>
           <a:xfrm rot="12600">
-            <a:off x="2241000" y="3685320"/>
-            <a:ext cx="8010360" cy="1287000"/>
+            <a:off x="2241000" y="3684960"/>
+            <a:ext cx="8010000" cy="1286640"/>
           </a:xfrm>
           <a:prstGeom prst="rect">
             <a:avLst/>
@@ -6749,7 +6749,7 @@
               </a:lnSpc>
             </a:pPr>
             <a:r>
-              <a:rPr b="1" lang="en-US" sz="8000" spc="2189" strike="noStrike">
+              <a:rPr b="1" lang="en-US" sz="8000" spc="2186" strike="noStrike">
                 <a:solidFill>
                   <a:srgbClr val="136083"/>
                 </a:solidFill>
@@ -6786,7 +6786,7 @@
         <p:spPr>
           <a:xfrm>
             <a:off x="4656600" y="5534640"/>
-            <a:ext cx="348840" cy="350280"/>
+            <a:ext cx="348480" cy="349920"/>
           </a:xfrm>
           <a:custGeom>
             <a:avLst/>
@@ -6974,7 +6974,7 @@
         <p:spPr>
           <a:xfrm>
             <a:off x="5106600" y="5551200"/>
-            <a:ext cx="1832400" cy="332640"/>
+            <a:ext cx="1832040" cy="332280"/>
           </a:xfrm>
           <a:prstGeom prst="rect">
             <a:avLst/>
@@ -7036,7 +7036,7 @@
         <p:spPr>
           <a:xfrm>
             <a:off x="4443840" y="1223280"/>
-            <a:ext cx="3303000" cy="1551600"/>
+            <a:ext cx="3302640" cy="1551240"/>
           </a:xfrm>
           <a:prstGeom prst="rect">
             <a:avLst/>
@@ -7098,7 +7098,7 @@
         <p:spPr>
           <a:xfrm>
             <a:off x="3805560" y="6123600"/>
-            <a:ext cx="3769200" cy="241560"/>
+            <a:ext cx="3768840" cy="241200"/>
           </a:xfrm>
           <a:prstGeom prst="rect">
             <a:avLst/>
@@ -7124,7 +7124,7 @@
         <p:spPr>
           <a:xfrm>
             <a:off x="7675920" y="5875560"/>
-            <a:ext cx="3027600" cy="363960"/>
+            <a:ext cx="3027240" cy="363600"/>
           </a:xfrm>
           <a:prstGeom prst="rect">
             <a:avLst/>
@@ -7313,7 +7313,7 @@
         <p:spPr>
           <a:xfrm>
             <a:off x="0" y="205200"/>
-            <a:ext cx="12190680" cy="599400"/>
+            <a:ext cx="12190320" cy="599040"/>
           </a:xfrm>
           <a:prstGeom prst="rect">
             <a:avLst/>
@@ -7349,7 +7349,7 @@
         <p:spPr>
           <a:xfrm flipH="1">
             <a:off x="264960" y="806040"/>
-            <a:ext cx="310680" cy="87840"/>
+            <a:ext cx="310320" cy="87480"/>
           </a:xfrm>
           <a:custGeom>
             <a:avLst/>
@@ -7407,8 +7407,8 @@
         </p:nvSpPr>
         <p:spPr>
           <a:xfrm flipV="1">
-            <a:off x="1457280" y="114840"/>
-            <a:ext cx="310680" cy="87840"/>
+            <a:off x="1457280" y="114120"/>
+            <a:ext cx="310320" cy="87480"/>
           </a:xfrm>
           <a:custGeom>
             <a:avLst/>
@@ -7467,7 +7467,7 @@
         <p:spPr>
           <a:xfrm flipH="1">
             <a:off x="311040" y="116280"/>
-            <a:ext cx="1401480" cy="777960"/>
+            <a:ext cx="1401120" cy="777600"/>
           </a:xfrm>
           <a:prstGeom prst="parallelogram">
             <a:avLst>
@@ -7505,7 +7505,7 @@
         <p:spPr>
           <a:xfrm>
             <a:off x="302040" y="244080"/>
-            <a:ext cx="1322640" cy="515880"/>
+            <a:ext cx="1322280" cy="515520"/>
           </a:xfrm>
           <a:prstGeom prst="rect">
             <a:avLst/>
@@ -7567,7 +7567,7 @@
         <p:spPr>
           <a:xfrm>
             <a:off x="2021400" y="244080"/>
-            <a:ext cx="2499840" cy="515160"/>
+            <a:ext cx="2499480" cy="514800"/>
           </a:xfrm>
           <a:prstGeom prst="rect">
             <a:avLst/>
@@ -7592,7 +7592,7 @@
               </a:lnSpc>
             </a:pPr>
             <a:r>
-              <a:rPr b="0" lang="en-US" sz="2800" spc="290" strike="noStrike">
+              <a:rPr b="0" lang="en-US" sz="2800" spc="287" strike="noStrike">
                 <a:solidFill>
                   <a:srgbClr val="ffffff"/>
                 </a:solidFill>
@@ -7629,7 +7629,7 @@
         <p:spPr>
           <a:xfrm>
             <a:off x="3240000" y="2088000"/>
-            <a:ext cx="4212000" cy="868320"/>
+            <a:ext cx="4211640" cy="867960"/>
           </a:xfrm>
           <a:custGeom>
             <a:avLst/>
@@ -7803,7 +7803,7 @@
         <p:spPr>
           <a:xfrm>
             <a:off x="3312000" y="3384000"/>
-            <a:ext cx="4248000" cy="864000"/>
+            <a:ext cx="4247640" cy="863640"/>
           </a:xfrm>
           <a:prstGeom prst="rect">
             <a:avLst/>
@@ -7826,7 +7826,11 @@
         <p:txBody>
           <a:bodyPr wrap="none" lIns="90000" rIns="90000" tIns="45000" bIns="45000" anchor="ctr"/>
           <a:p>
-            <a:pPr algn="ctr"/>
+            <a:pPr algn="ctr">
+              <a:lnSpc>
+                <a:spcPct val="100000"/>
+              </a:lnSpc>
+            </a:pPr>
             <a:r>
               <a:rPr b="0" lang="en-US" sz="1800" spc="-1" strike="noStrike">
                 <a:solidFill>
@@ -7838,6 +7842,7 @@
                   </a:solidFill>
                 </a:uFill>
                 <a:latin typeface="Arial"/>
+                <a:ea typeface="DejaVu Sans"/>
               </a:rPr>
               <a:t>对新人提供系统的介绍，包括组织结</a:t>
             </a:r>
@@ -7854,7 +7859,11 @@
             </a:endParaRPr>
           </a:p>
           <a:p>
-            <a:pPr algn="ctr"/>
+            <a:pPr algn="ctr">
+              <a:lnSpc>
+                <a:spcPct val="100000"/>
+              </a:lnSpc>
+            </a:pPr>
             <a:r>
               <a:rPr b="0" lang="en-US" sz="1800" spc="-1" strike="noStrike">
                 <a:solidFill>
@@ -7866,6 +7875,7 @@
                   </a:solidFill>
                 </a:uFill>
                 <a:latin typeface="Arial"/>
+                <a:ea typeface="DejaVu Sans"/>
               </a:rPr>
               <a:t>  </a:t>
             </a:r>
@@ -7880,6 +7890,7 @@
                   </a:solidFill>
                 </a:uFill>
                 <a:latin typeface="Arial"/>
+                <a:ea typeface="DejaVu Sans"/>
               </a:rPr>
               <a:t>构，项目架构，业务现状，流程规范等。</a:t>
             </a:r>
@@ -7955,7 +7966,7 @@
         <p:spPr>
           <a:xfrm>
             <a:off x="0" y="2462040"/>
-            <a:ext cx="12190680" cy="1894320"/>
+            <a:ext cx="12190320" cy="1893960"/>
           </a:xfrm>
           <a:prstGeom prst="rect">
             <a:avLst/>
@@ -7989,7 +8000,7 @@
         <p:spPr>
           <a:xfrm>
             <a:off x="3714120" y="2202480"/>
-            <a:ext cx="257040" cy="258120"/>
+            <a:ext cx="256680" cy="257760"/>
           </a:xfrm>
           <a:custGeom>
             <a:avLst/>
@@ -8042,7 +8053,7 @@
         <p:spPr>
           <a:xfrm flipV="1">
             <a:off x="510120" y="4356000"/>
-            <a:ext cx="262080" cy="263160"/>
+            <a:ext cx="261720" cy="262800"/>
           </a:xfrm>
           <a:custGeom>
             <a:avLst/>
@@ -8095,7 +8106,7 @@
         <p:spPr>
           <a:xfrm>
             <a:off x="639000" y="2203200"/>
-            <a:ext cx="3207960" cy="2411640"/>
+            <a:ext cx="3207600" cy="2411280"/>
           </a:xfrm>
           <a:prstGeom prst="parallelogram">
             <a:avLst>
@@ -8133,7 +8144,7 @@
         <p:spPr>
           <a:xfrm>
             <a:off x="1487520" y="2531520"/>
-            <a:ext cx="1761480" cy="1715040"/>
+            <a:ext cx="1761120" cy="1714680"/>
           </a:xfrm>
           <a:prstGeom prst="rect">
             <a:avLst/>
@@ -8195,7 +8206,7 @@
         <p:spPr>
           <a:xfrm>
             <a:off x="4446720" y="2890800"/>
-            <a:ext cx="6732360" cy="912960"/>
+            <a:ext cx="6732000" cy="912600"/>
           </a:xfrm>
           <a:prstGeom prst="rect">
             <a:avLst/>
@@ -8306,7 +8317,7 @@
         <p:spPr>
           <a:xfrm>
             <a:off x="0" y="205200"/>
-            <a:ext cx="12190680" cy="599400"/>
+            <a:ext cx="12190320" cy="599040"/>
           </a:xfrm>
           <a:prstGeom prst="rect">
             <a:avLst/>
@@ -8342,7 +8353,7 @@
         <p:spPr>
           <a:xfrm flipH="1">
             <a:off x="264960" y="806040"/>
-            <a:ext cx="310680" cy="87840"/>
+            <a:ext cx="310320" cy="87480"/>
           </a:xfrm>
           <a:custGeom>
             <a:avLst/>
@@ -8400,8 +8411,8 @@
         </p:nvSpPr>
         <p:spPr>
           <a:xfrm flipV="1">
-            <a:off x="1457280" y="114840"/>
-            <a:ext cx="310680" cy="87840"/>
+            <a:off x="1457280" y="114120"/>
+            <a:ext cx="310320" cy="87480"/>
           </a:xfrm>
           <a:custGeom>
             <a:avLst/>
@@ -8460,7 +8471,7 @@
         <p:spPr>
           <a:xfrm flipH="1">
             <a:off x="311040" y="116280"/>
-            <a:ext cx="1401480" cy="777960"/>
+            <a:ext cx="1401120" cy="777600"/>
           </a:xfrm>
           <a:prstGeom prst="parallelogram">
             <a:avLst>
@@ -8498,7 +8509,7 @@
         <p:spPr>
           <a:xfrm>
             <a:off x="302040" y="244080"/>
-            <a:ext cx="1322640" cy="515880"/>
+            <a:ext cx="1322280" cy="515520"/>
           </a:xfrm>
           <a:prstGeom prst="rect">
             <a:avLst/>
@@ -8560,7 +8571,7 @@
         <p:spPr>
           <a:xfrm>
             <a:off x="2058840" y="244080"/>
-            <a:ext cx="1713240" cy="515160"/>
+            <a:ext cx="1712880" cy="514800"/>
           </a:xfrm>
           <a:prstGeom prst="rect">
             <a:avLst/>
@@ -8585,7 +8596,7 @@
               </a:lnSpc>
             </a:pPr>
             <a:r>
-              <a:rPr b="0" lang="en-US" sz="2800" spc="290" strike="noStrike">
+              <a:rPr b="0" lang="en-US" sz="2800" spc="287" strike="noStrike">
                 <a:solidFill>
                   <a:srgbClr val="ffffff"/>
                 </a:solidFill>
@@ -8622,7 +8633,7 @@
         <p:spPr>
           <a:xfrm>
             <a:off x="3147840" y="1794960"/>
-            <a:ext cx="4555440" cy="868320"/>
+            <a:ext cx="4555080" cy="867960"/>
           </a:xfrm>
           <a:custGeom>
             <a:avLst/>
@@ -8796,7 +8807,7 @@
         <p:spPr>
           <a:xfrm>
             <a:off x="3166560" y="3312000"/>
-            <a:ext cx="4536720" cy="868320"/>
+            <a:ext cx="4536360" cy="867960"/>
           </a:xfrm>
           <a:custGeom>
             <a:avLst/>
@@ -8970,7 +8981,7 @@
         <p:spPr>
           <a:xfrm>
             <a:off x="2751840" y="1844280"/>
-            <a:ext cx="726480" cy="726480"/>
+            <a:ext cx="726120" cy="726120"/>
           </a:xfrm>
           <a:prstGeom prst="ellipse">
             <a:avLst/>
@@ -9034,7 +9045,7 @@
         <p:spPr>
           <a:xfrm>
             <a:off x="2770560" y="3403080"/>
-            <a:ext cx="726480" cy="726480"/>
+            <a:ext cx="726120" cy="726120"/>
           </a:xfrm>
           <a:prstGeom prst="ellipse">
             <a:avLst/>
@@ -9098,7 +9109,7 @@
         <p:spPr>
           <a:xfrm>
             <a:off x="3238560" y="4824000"/>
-            <a:ext cx="4464720" cy="868320"/>
+            <a:ext cx="4464360" cy="867960"/>
           </a:xfrm>
           <a:custGeom>
             <a:avLst/>
@@ -9272,7 +9283,7 @@
         <p:spPr>
           <a:xfrm>
             <a:off x="2770920" y="3403440"/>
-            <a:ext cx="726480" cy="726480"/>
+            <a:ext cx="726120" cy="726120"/>
           </a:xfrm>
           <a:prstGeom prst="ellipse">
             <a:avLst/>
@@ -9336,7 +9347,7 @@
         <p:spPr>
           <a:xfrm>
             <a:off x="2770920" y="3403440"/>
-            <a:ext cx="726480" cy="726480"/>
+            <a:ext cx="726120" cy="726120"/>
           </a:xfrm>
           <a:prstGeom prst="ellipse">
             <a:avLst/>
@@ -9400,7 +9411,7 @@
         <p:spPr>
           <a:xfrm>
             <a:off x="2808000" y="4888800"/>
-            <a:ext cx="726480" cy="726480"/>
+            <a:ext cx="726120" cy="726120"/>
           </a:xfrm>
           <a:prstGeom prst="ellipse">
             <a:avLst/>
@@ -9513,7 +9524,7 @@
         <p:spPr>
           <a:xfrm>
             <a:off x="0" y="205200"/>
-            <a:ext cx="12190680" cy="599400"/>
+            <a:ext cx="12190320" cy="599040"/>
           </a:xfrm>
           <a:prstGeom prst="rect">
             <a:avLst/>
@@ -9549,7 +9560,7 @@
         <p:spPr>
           <a:xfrm flipH="1">
             <a:off x="264960" y="806040"/>
-            <a:ext cx="310680" cy="87840"/>
+            <a:ext cx="310320" cy="87480"/>
           </a:xfrm>
           <a:custGeom>
             <a:avLst/>
@@ -9607,8 +9618,8 @@
         </p:nvSpPr>
         <p:spPr>
           <a:xfrm flipV="1">
-            <a:off x="1457280" y="114840"/>
-            <a:ext cx="310680" cy="87840"/>
+            <a:off x="1457280" y="114120"/>
+            <a:ext cx="310320" cy="87480"/>
           </a:xfrm>
           <a:custGeom>
             <a:avLst/>
@@ -9667,7 +9678,7 @@
         <p:spPr>
           <a:xfrm flipH="1">
             <a:off x="311040" y="116280"/>
-            <a:ext cx="1401480" cy="777960"/>
+            <a:ext cx="1401120" cy="777600"/>
           </a:xfrm>
           <a:prstGeom prst="parallelogram">
             <a:avLst>
@@ -9705,7 +9716,7 @@
         <p:spPr>
           <a:xfrm>
             <a:off x="302040" y="244080"/>
-            <a:ext cx="1322640" cy="515880"/>
+            <a:ext cx="1322280" cy="515520"/>
           </a:xfrm>
           <a:prstGeom prst="rect">
             <a:avLst/>
@@ -9767,7 +9778,7 @@
         <p:spPr>
           <a:xfrm>
             <a:off x="2058840" y="244080"/>
-            <a:ext cx="1713240" cy="515160"/>
+            <a:ext cx="1712880" cy="514800"/>
           </a:xfrm>
           <a:prstGeom prst="rect">
             <a:avLst/>
@@ -9792,7 +9803,7 @@
               </a:lnSpc>
             </a:pPr>
             <a:r>
-              <a:rPr b="0" lang="en-US" sz="2800" spc="290" strike="noStrike">
+              <a:rPr b="0" lang="en-US" sz="2800" spc="287" strike="noStrike">
                 <a:solidFill>
                   <a:srgbClr val="ffffff"/>
                 </a:solidFill>
@@ -9829,7 +9840,7 @@
         <p:spPr>
           <a:xfrm>
             <a:off x="1527840" y="1794960"/>
-            <a:ext cx="3763440" cy="868320"/>
+            <a:ext cx="3763080" cy="867960"/>
           </a:xfrm>
           <a:custGeom>
             <a:avLst/>
@@ -10003,7 +10014,7 @@
         <p:spPr>
           <a:xfrm>
             <a:off x="1546560" y="3312000"/>
-            <a:ext cx="3816720" cy="868320"/>
+            <a:ext cx="3816360" cy="867960"/>
           </a:xfrm>
           <a:custGeom>
             <a:avLst/>
@@ -10177,7 +10188,7 @@
         <p:spPr>
           <a:xfrm>
             <a:off x="1131840" y="1844280"/>
-            <a:ext cx="726480" cy="726480"/>
+            <a:ext cx="726120" cy="726120"/>
           </a:xfrm>
           <a:prstGeom prst="ellipse">
             <a:avLst/>
@@ -10241,7 +10252,7 @@
         <p:spPr>
           <a:xfrm>
             <a:off x="1150560" y="3403080"/>
-            <a:ext cx="726480" cy="726480"/>
+            <a:ext cx="726120" cy="726120"/>
           </a:xfrm>
           <a:prstGeom prst="ellipse">
             <a:avLst/>
@@ -10305,7 +10316,7 @@
         <p:spPr>
           <a:xfrm>
             <a:off x="1618560" y="4824000"/>
-            <a:ext cx="3816720" cy="868320"/>
+            <a:ext cx="3816360" cy="867960"/>
           </a:xfrm>
           <a:custGeom>
             <a:avLst/>
@@ -10479,7 +10490,7 @@
         <p:spPr>
           <a:xfrm>
             <a:off x="1150920" y="3403440"/>
-            <a:ext cx="726480" cy="726480"/>
+            <a:ext cx="726120" cy="726120"/>
           </a:xfrm>
           <a:prstGeom prst="ellipse">
             <a:avLst/>
@@ -10543,7 +10554,7 @@
         <p:spPr>
           <a:xfrm>
             <a:off x="1150920" y="3403440"/>
-            <a:ext cx="726480" cy="726480"/>
+            <a:ext cx="726120" cy="726120"/>
           </a:xfrm>
           <a:prstGeom prst="ellipse">
             <a:avLst/>
@@ -10607,7 +10618,7 @@
         <p:spPr>
           <a:xfrm>
             <a:off x="1188000" y="4888800"/>
-            <a:ext cx="726480" cy="726480"/>
+            <a:ext cx="726120" cy="726120"/>
           </a:xfrm>
           <a:prstGeom prst="ellipse">
             <a:avLst/>
@@ -10671,7 +10682,7 @@
         <p:spPr>
           <a:xfrm>
             <a:off x="5652000" y="3456000"/>
-            <a:ext cx="1511280" cy="647280"/>
+            <a:ext cx="1510920" cy="646920"/>
           </a:xfrm>
           <a:custGeom>
             <a:avLst/>
@@ -10768,7 +10779,7 @@
         <p:spPr>
           <a:xfrm>
             <a:off x="7560000" y="1872000"/>
-            <a:ext cx="575280" cy="575280"/>
+            <a:ext cx="574920" cy="574920"/>
           </a:xfrm>
           <a:prstGeom prst="rect">
             <a:avLst/>
@@ -10834,7 +10845,7 @@
         <p:spPr>
           <a:xfrm>
             <a:off x="8273880" y="1800000"/>
-            <a:ext cx="2237400" cy="680760"/>
+            <a:ext cx="2237040" cy="680400"/>
           </a:xfrm>
           <a:prstGeom prst="rect">
             <a:avLst/>
@@ -10919,7 +10930,7 @@
         <p:spPr>
           <a:xfrm>
             <a:off x="7560000" y="3456000"/>
-            <a:ext cx="575280" cy="575280"/>
+            <a:ext cx="574920" cy="574920"/>
           </a:xfrm>
           <a:prstGeom prst="rect">
             <a:avLst/>
@@ -10985,7 +10996,7 @@
         <p:spPr>
           <a:xfrm>
             <a:off x="8136000" y="3422520"/>
-            <a:ext cx="3609000" cy="680760"/>
+            <a:ext cx="3608640" cy="680400"/>
           </a:xfrm>
           <a:prstGeom prst="rect">
             <a:avLst/>
@@ -11070,7 +11081,7 @@
         <p:spPr>
           <a:xfrm>
             <a:off x="7596000" y="4968000"/>
-            <a:ext cx="575280" cy="575280"/>
+            <a:ext cx="574920" cy="574920"/>
           </a:xfrm>
           <a:prstGeom prst="rect">
             <a:avLst/>
@@ -11136,7 +11147,7 @@
         <p:spPr>
           <a:xfrm>
             <a:off x="8174880" y="4896000"/>
-            <a:ext cx="3609000" cy="680760"/>
+            <a:ext cx="3608640" cy="680400"/>
           </a:xfrm>
           <a:prstGeom prst="rect">
             <a:avLst/>
@@ -11270,7 +11281,7 @@
         <p:spPr>
           <a:xfrm>
             <a:off x="0" y="2462040"/>
-            <a:ext cx="12190680" cy="1894320"/>
+            <a:ext cx="12190320" cy="1893960"/>
           </a:xfrm>
           <a:prstGeom prst="rect">
             <a:avLst/>
@@ -11304,7 +11315,7 @@
         <p:spPr>
           <a:xfrm>
             <a:off x="3714120" y="2202480"/>
-            <a:ext cx="257040" cy="258120"/>
+            <a:ext cx="256680" cy="257760"/>
           </a:xfrm>
           <a:custGeom>
             <a:avLst/>
@@ -11357,7 +11368,7 @@
         <p:spPr>
           <a:xfrm flipV="1">
             <a:off x="510120" y="4356000"/>
-            <a:ext cx="262080" cy="263160"/>
+            <a:ext cx="261720" cy="262800"/>
           </a:xfrm>
           <a:custGeom>
             <a:avLst/>
@@ -11410,7 +11421,7 @@
         <p:spPr>
           <a:xfrm>
             <a:off x="639000" y="2203200"/>
-            <a:ext cx="3207960" cy="2411640"/>
+            <a:ext cx="3207600" cy="2411280"/>
           </a:xfrm>
           <a:prstGeom prst="parallelogram">
             <a:avLst>
@@ -11448,7 +11459,7 @@
         <p:spPr>
           <a:xfrm>
             <a:off x="1487520" y="2531520"/>
-            <a:ext cx="1761480" cy="1715040"/>
+            <a:ext cx="1761120" cy="1714680"/>
           </a:xfrm>
           <a:prstGeom prst="rect">
             <a:avLst/>
@@ -11510,7 +11521,7 @@
         <p:spPr>
           <a:xfrm>
             <a:off x="4446720" y="2766960"/>
-            <a:ext cx="6732360" cy="912960"/>
+            <a:ext cx="6732000" cy="912600"/>
           </a:xfrm>
           <a:prstGeom prst="rect">
             <a:avLst/>
@@ -11572,7 +11583,7 @@
         <p:spPr>
           <a:xfrm>
             <a:off x="4446720" y="3692880"/>
-            <a:ext cx="4099680" cy="456480"/>
+            <a:ext cx="4099320" cy="456120"/>
           </a:xfrm>
           <a:prstGeom prst="rect">
             <a:avLst/>
@@ -11647,7 +11658,7 @@
         <p:spPr>
           <a:xfrm>
             <a:off x="0" y="205200"/>
-            <a:ext cx="12190680" cy="599400"/>
+            <a:ext cx="12190320" cy="599040"/>
           </a:xfrm>
           <a:prstGeom prst="rect">
             <a:avLst/>
@@ -11683,7 +11694,7 @@
         <p:spPr>
           <a:xfrm flipH="1">
             <a:off x="264960" y="806040"/>
-            <a:ext cx="310680" cy="87840"/>
+            <a:ext cx="310320" cy="87480"/>
           </a:xfrm>
           <a:custGeom>
             <a:avLst/>
@@ -11741,8 +11752,8 @@
         </p:nvSpPr>
         <p:spPr>
           <a:xfrm flipV="1">
-            <a:off x="1457280" y="114840"/>
-            <a:ext cx="310680" cy="87840"/>
+            <a:off x="1457280" y="114120"/>
+            <a:ext cx="310320" cy="87480"/>
           </a:xfrm>
           <a:custGeom>
             <a:avLst/>
@@ -11801,7 +11812,7 @@
         <p:spPr>
           <a:xfrm flipH="1">
             <a:off x="311040" y="116280"/>
-            <a:ext cx="1401480" cy="777960"/>
+            <a:ext cx="1401120" cy="777600"/>
           </a:xfrm>
           <a:prstGeom prst="parallelogram">
             <a:avLst>
@@ -11839,7 +11850,7 @@
         <p:spPr>
           <a:xfrm>
             <a:off x="302040" y="244080"/>
-            <a:ext cx="1322640" cy="515880"/>
+            <a:ext cx="1322280" cy="515520"/>
           </a:xfrm>
           <a:prstGeom prst="rect">
             <a:avLst/>
@@ -11901,7 +11912,7 @@
         <p:spPr>
           <a:xfrm>
             <a:off x="2021400" y="244080"/>
-            <a:ext cx="2499840" cy="515160"/>
+            <a:ext cx="2499480" cy="514800"/>
           </a:xfrm>
           <a:prstGeom prst="rect">
             <a:avLst/>
@@ -11926,7 +11937,7 @@
               </a:lnSpc>
             </a:pPr>
             <a:r>
-              <a:rPr b="0" lang="en-US" sz="2800" spc="290" strike="noStrike">
+              <a:rPr b="0" lang="en-US" sz="2800" spc="287" strike="noStrike">
                 <a:solidFill>
                   <a:srgbClr val="ffffff"/>
                 </a:solidFill>
@@ -11963,7 +11974,7 @@
         <p:spPr>
           <a:xfrm>
             <a:off x="5044320" y="3888000"/>
-            <a:ext cx="1434960" cy="1438560"/>
+            <a:ext cx="1434600" cy="1438200"/>
           </a:xfrm>
           <a:prstGeom prst="ellipse">
             <a:avLst/>
@@ -12027,7 +12038,7 @@
         <p:spPr>
           <a:xfrm>
             <a:off x="7087320" y="2520720"/>
-            <a:ext cx="1436760" cy="1438560"/>
+            <a:ext cx="1436400" cy="1438200"/>
           </a:xfrm>
           <a:prstGeom prst="ellipse">
             <a:avLst/>
@@ -12091,7 +12102,7 @@
         <p:spPr>
           <a:xfrm>
             <a:off x="9362520" y="1152000"/>
-            <a:ext cx="1436760" cy="1438560"/>
+            <a:ext cx="1436400" cy="1438200"/>
           </a:xfrm>
           <a:prstGeom prst="ellipse">
             <a:avLst/>
@@ -12185,7 +12196,7 @@
         <p:spPr>
           <a:xfrm>
             <a:off x="4608000" y="2709000"/>
-            <a:ext cx="6582960" cy="4020120"/>
+            <a:ext cx="6582600" cy="4019760"/>
           </a:xfrm>
           <a:custGeom>
             <a:avLst/>
@@ -12293,7 +12304,7 @@
         <p:spPr>
           <a:xfrm>
             <a:off x="7592760" y="1645560"/>
-            <a:ext cx="1036080" cy="699120"/>
+            <a:ext cx="1035720" cy="698760"/>
           </a:xfrm>
           <a:prstGeom prst="rect">
             <a:avLst/>
@@ -12319,7 +12330,7 @@
         <p:spPr>
           <a:xfrm>
             <a:off x="5690880" y="3061440"/>
-            <a:ext cx="1013040" cy="699120"/>
+            <a:ext cx="1012680" cy="698760"/>
           </a:xfrm>
           <a:prstGeom prst="rect">
             <a:avLst/>
@@ -12345,7 +12356,7 @@
         <p:spPr>
           <a:xfrm>
             <a:off x="3579840" y="4448160"/>
-            <a:ext cx="1224360" cy="699120"/>
+            <a:ext cx="1224000" cy="698760"/>
           </a:xfrm>
           <a:prstGeom prst="rect">
             <a:avLst/>
@@ -12371,7 +12382,7 @@
         <p:spPr>
           <a:xfrm>
             <a:off x="5184000" y="5832000"/>
-            <a:ext cx="1198080" cy="394200"/>
+            <a:ext cx="1197720" cy="393840"/>
           </a:xfrm>
           <a:prstGeom prst="rect">
             <a:avLst/>
@@ -12433,7 +12444,7 @@
         <p:spPr>
           <a:xfrm>
             <a:off x="7344000" y="4464000"/>
-            <a:ext cx="1198080" cy="394200"/>
+            <a:ext cx="1197720" cy="393840"/>
           </a:xfrm>
           <a:prstGeom prst="rect">
             <a:avLst/>
@@ -12495,7 +12506,7 @@
         <p:spPr>
           <a:xfrm>
             <a:off x="9576000" y="3096000"/>
-            <a:ext cx="1198080" cy="394200"/>
+            <a:ext cx="1197720" cy="393840"/>
           </a:xfrm>
           <a:prstGeom prst="rect">
             <a:avLst/>
@@ -12557,7 +12568,7 @@
         <p:spPr>
           <a:xfrm>
             <a:off x="3191040" y="2709000"/>
-            <a:ext cx="3998520" cy="515160"/>
+            <a:ext cx="3998160" cy="514800"/>
           </a:xfrm>
           <a:prstGeom prst="rect">
             <a:avLst/>
@@ -12673,7 +12684,7 @@
         <p:spPr>
           <a:xfrm>
             <a:off x="1296000" y="4464000"/>
-            <a:ext cx="1198080" cy="425160"/>
+            <a:ext cx="1197720" cy="424800"/>
           </a:xfrm>
           <a:prstGeom prst="rect">
             <a:avLst/>
@@ -12699,7 +12710,7 @@
         <p:spPr>
           <a:xfrm>
             <a:off x="1159920" y="1402200"/>
-            <a:ext cx="4366440" cy="785520"/>
+            <a:ext cx="4366080" cy="785160"/>
           </a:xfrm>
           <a:prstGeom prst="rect">
             <a:avLst/>
@@ -12824,7 +12835,7 @@
         <p:spPr>
           <a:xfrm>
             <a:off x="1191600" y="2628000"/>
-            <a:ext cx="3704040" cy="1095480"/>
+            <a:ext cx="3703680" cy="1095120"/>
           </a:xfrm>
           <a:prstGeom prst="rect">
             <a:avLst/>
@@ -12997,7 +13008,7 @@
         <p:spPr>
           <a:xfrm>
             <a:off x="1227600" y="4032000"/>
-            <a:ext cx="2768040" cy="1765800"/>
+            <a:ext cx="2767680" cy="1765440"/>
           </a:xfrm>
           <a:prstGeom prst="rect">
             <a:avLst/>
@@ -13171,7 +13182,7 @@
         <p:spPr>
           <a:xfrm>
             <a:off x="0" y="205200"/>
-            <a:ext cx="12190680" cy="599400"/>
+            <a:ext cx="12190320" cy="599040"/>
           </a:xfrm>
           <a:prstGeom prst="rect">
             <a:avLst/>
@@ -13207,7 +13218,7 @@
         <p:spPr>
           <a:xfrm flipH="1">
             <a:off x="264960" y="806040"/>
-            <a:ext cx="310680" cy="87840"/>
+            <a:ext cx="310320" cy="87480"/>
           </a:xfrm>
           <a:custGeom>
             <a:avLst/>
@@ -13265,8 +13276,8 @@
         </p:nvSpPr>
         <p:spPr>
           <a:xfrm flipV="1">
-            <a:off x="1457280" y="114840"/>
-            <a:ext cx="310680" cy="87840"/>
+            <a:off x="1457280" y="114120"/>
+            <a:ext cx="310320" cy="87480"/>
           </a:xfrm>
           <a:custGeom>
             <a:avLst/>
@@ -13325,7 +13336,7 @@
         <p:spPr>
           <a:xfrm flipH="1">
             <a:off x="311040" y="116280"/>
-            <a:ext cx="1401480" cy="777960"/>
+            <a:ext cx="1401120" cy="777600"/>
           </a:xfrm>
           <a:prstGeom prst="parallelogram">
             <a:avLst>
@@ -13363,7 +13374,7 @@
         <p:spPr>
           <a:xfrm>
             <a:off x="302040" y="244080"/>
-            <a:ext cx="1322640" cy="515880"/>
+            <a:ext cx="1322280" cy="515520"/>
           </a:xfrm>
           <a:prstGeom prst="rect">
             <a:avLst/>
@@ -13425,7 +13436,7 @@
         <p:spPr>
           <a:xfrm>
             <a:off x="2002320" y="244080"/>
-            <a:ext cx="2893320" cy="515160"/>
+            <a:ext cx="2892960" cy="514800"/>
           </a:xfrm>
           <a:prstGeom prst="rect">
             <a:avLst/>
@@ -13450,7 +13461,7 @@
               </a:lnSpc>
             </a:pPr>
             <a:r>
-              <a:rPr b="0" lang="en-US" sz="2800" spc="290" strike="noStrike">
+              <a:rPr b="0" lang="en-US" sz="2800" spc="287" strike="noStrike">
                 <a:solidFill>
                   <a:srgbClr val="ffffff"/>
                 </a:solidFill>
@@ -13487,7 +13498,7 @@
         <p:spPr>
           <a:xfrm>
             <a:off x="1418040" y="1471320"/>
-            <a:ext cx="798480" cy="798480"/>
+            <a:ext cx="798120" cy="798120"/>
           </a:xfrm>
           <a:prstGeom prst="ellipse">
             <a:avLst/>
@@ -13515,7 +13526,7 @@
         <p:spPr>
           <a:xfrm>
             <a:off x="1451160" y="1578960"/>
-            <a:ext cx="681480" cy="576000"/>
+            <a:ext cx="681120" cy="575640"/>
           </a:xfrm>
           <a:prstGeom prst="rect">
             <a:avLst/>
@@ -13577,7 +13588,7 @@
         <p:spPr>
           <a:xfrm>
             <a:off x="1418040" y="3407400"/>
-            <a:ext cx="798480" cy="798480"/>
+            <a:ext cx="798120" cy="798120"/>
           </a:xfrm>
           <a:prstGeom prst="ellipse">
             <a:avLst/>
@@ -13605,7 +13616,7 @@
         <p:spPr>
           <a:xfrm>
             <a:off x="1451160" y="3515040"/>
-            <a:ext cx="681480" cy="576000"/>
+            <a:ext cx="681120" cy="575640"/>
           </a:xfrm>
           <a:prstGeom prst="rect">
             <a:avLst/>
@@ -13667,7 +13678,7 @@
         <p:spPr>
           <a:xfrm>
             <a:off x="1418040" y="5396760"/>
-            <a:ext cx="798480" cy="798480"/>
+            <a:ext cx="798120" cy="798120"/>
           </a:xfrm>
           <a:prstGeom prst="ellipse">
             <a:avLst/>
@@ -13695,7 +13706,7 @@
         <p:spPr>
           <a:xfrm>
             <a:off x="1451160" y="5504400"/>
-            <a:ext cx="681480" cy="576000"/>
+            <a:ext cx="681120" cy="575640"/>
           </a:xfrm>
           <a:prstGeom prst="rect">
             <a:avLst/>
@@ -13785,7 +13796,7 @@
         <p:spPr>
           <a:xfrm>
             <a:off x="2354040" y="1837800"/>
-            <a:ext cx="8694000" cy="576000"/>
+            <a:ext cx="8693640" cy="575640"/>
           </a:xfrm>
           <a:prstGeom prst="rect">
             <a:avLst/>
@@ -13811,7 +13822,7 @@
         <p:spPr>
           <a:xfrm>
             <a:off x="2354040" y="3299760"/>
-            <a:ext cx="2325600" cy="424440"/>
+            <a:ext cx="2325240" cy="424080"/>
           </a:xfrm>
           <a:prstGeom prst="rect">
             <a:avLst/>
@@ -13873,7 +13884,7 @@
         <p:spPr>
           <a:xfrm>
             <a:off x="2354040" y="5609880"/>
-            <a:ext cx="8694000" cy="818640"/>
+            <a:ext cx="8693640" cy="818280"/>
           </a:xfrm>
           <a:prstGeom prst="rect">
             <a:avLst/>
@@ -14059,7 +14070,7 @@
         <p:spPr>
           <a:xfrm>
             <a:off x="2354040" y="1380960"/>
-            <a:ext cx="2404440" cy="423720"/>
+            <a:ext cx="2404080" cy="423360"/>
           </a:xfrm>
           <a:prstGeom prst="rect">
             <a:avLst/>
@@ -14121,7 +14132,7 @@
         <p:spPr>
           <a:xfrm>
             <a:off x="2354040" y="3767760"/>
-            <a:ext cx="8694000" cy="575280"/>
+            <a:ext cx="8693640" cy="574920"/>
           </a:xfrm>
           <a:prstGeom prst="rect">
             <a:avLst/>
@@ -14216,7 +14227,7 @@
         <p:spPr>
           <a:xfrm>
             <a:off x="2354040" y="5144040"/>
-            <a:ext cx="2069280" cy="424440"/>
+            <a:ext cx="2068920" cy="424080"/>
           </a:xfrm>
           <a:prstGeom prst="rect">
             <a:avLst/>
@@ -14278,7 +14289,7 @@
         <p:spPr>
           <a:xfrm>
             <a:off x="2402640" y="1837800"/>
-            <a:ext cx="5805000" cy="876240"/>
+            <a:ext cx="5804640" cy="875880"/>
           </a:xfrm>
           <a:prstGeom prst="rect">
             <a:avLst/>
@@ -14389,7 +14400,7 @@
         <p:spPr>
           <a:xfrm>
             <a:off x="0" y="205200"/>
-            <a:ext cx="12190680" cy="599400"/>
+            <a:ext cx="12190320" cy="599040"/>
           </a:xfrm>
           <a:prstGeom prst="rect">
             <a:avLst/>
@@ -14425,7 +14436,7 @@
         <p:spPr>
           <a:xfrm flipH="1">
             <a:off x="264960" y="806040"/>
-            <a:ext cx="310680" cy="87840"/>
+            <a:ext cx="310320" cy="87480"/>
           </a:xfrm>
           <a:custGeom>
             <a:avLst/>
@@ -14483,8 +14494,8 @@
         </p:nvSpPr>
         <p:spPr>
           <a:xfrm flipV="1">
-            <a:off x="1457280" y="114840"/>
-            <a:ext cx="310680" cy="87840"/>
+            <a:off x="1457280" y="114120"/>
+            <a:ext cx="310320" cy="87480"/>
           </a:xfrm>
           <a:custGeom>
             <a:avLst/>
@@ -14543,7 +14554,7 @@
         <p:spPr>
           <a:xfrm flipH="1">
             <a:off x="311040" y="116280"/>
-            <a:ext cx="1401480" cy="777960"/>
+            <a:ext cx="1401120" cy="777600"/>
           </a:xfrm>
           <a:prstGeom prst="parallelogram">
             <a:avLst>
@@ -14581,7 +14592,7 @@
         <p:spPr>
           <a:xfrm>
             <a:off x="302040" y="244080"/>
-            <a:ext cx="1322640" cy="515880"/>
+            <a:ext cx="1322280" cy="515520"/>
           </a:xfrm>
           <a:prstGeom prst="rect">
             <a:avLst/>
@@ -14643,7 +14654,7 @@
         <p:spPr>
           <a:xfrm>
             <a:off x="2002320" y="244080"/>
-            <a:ext cx="2893320" cy="515160"/>
+            <a:ext cx="2892960" cy="514800"/>
           </a:xfrm>
           <a:prstGeom prst="rect">
             <a:avLst/>
@@ -14668,7 +14679,7 @@
               </a:lnSpc>
             </a:pPr>
             <a:r>
-              <a:rPr b="0" lang="en-US" sz="2800" spc="290" strike="noStrike">
+              <a:rPr b="0" lang="en-US" sz="2800" spc="287" strike="noStrike">
                 <a:solidFill>
                   <a:srgbClr val="ffffff"/>
                 </a:solidFill>
@@ -14705,7 +14716,7 @@
         <p:spPr>
           <a:xfrm>
             <a:off x="2859840" y="1715040"/>
-            <a:ext cx="2654640" cy="824760"/>
+            <a:ext cx="2654280" cy="824400"/>
           </a:xfrm>
           <a:prstGeom prst="rightArrow">
             <a:avLst>
@@ -14751,7 +14762,7 @@
         <p:spPr>
           <a:xfrm>
             <a:off x="2859840" y="2883240"/>
-            <a:ext cx="2654640" cy="824760"/>
+            <a:ext cx="2654280" cy="824400"/>
           </a:xfrm>
           <a:prstGeom prst="rightArrow">
             <a:avLst>
@@ -14797,7 +14808,7 @@
         <p:spPr>
           <a:xfrm>
             <a:off x="2859840" y="4051080"/>
-            <a:ext cx="2654640" cy="822600"/>
+            <a:ext cx="2654280" cy="822240"/>
           </a:xfrm>
           <a:prstGeom prst="rightArrow">
             <a:avLst>
@@ -14843,7 +14854,7 @@
         <p:spPr>
           <a:xfrm>
             <a:off x="2859840" y="5217120"/>
-            <a:ext cx="2654640" cy="824760"/>
+            <a:ext cx="2654280" cy="824400"/>
           </a:xfrm>
           <a:prstGeom prst="rightArrow">
             <a:avLst>
@@ -14888,8 +14899,8 @@
         </p:nvSpPr>
         <p:spPr>
           <a:xfrm flipV="1">
-            <a:off x="3916080" y="2411640"/>
-            <a:ext cx="138600" cy="126720"/>
+            <a:off x="3916080" y="2410920"/>
+            <a:ext cx="138240" cy="126360"/>
           </a:xfrm>
           <a:prstGeom prst="rtTriangle">
             <a:avLst/>
@@ -14925,7 +14936,7 @@
         <p:spPr>
           <a:xfrm>
             <a:off x="3916080" y="1715040"/>
-            <a:ext cx="138600" cy="126720"/>
+            <a:ext cx="138240" cy="126360"/>
           </a:xfrm>
           <a:prstGeom prst="rtTriangle">
             <a:avLst/>
@@ -14961,7 +14972,7 @@
         <p:spPr>
           <a:xfrm>
             <a:off x="1547640" y="1715040"/>
-            <a:ext cx="2366640" cy="824760"/>
+            <a:ext cx="2366280" cy="824400"/>
           </a:xfrm>
           <a:prstGeom prst="rect">
             <a:avLst/>
@@ -15032,8 +15043,8 @@
         </p:nvSpPr>
         <p:spPr>
           <a:xfrm flipV="1">
-            <a:off x="3916080" y="3579840"/>
-            <a:ext cx="138600" cy="126720"/>
+            <a:off x="3916080" y="3579120"/>
+            <a:ext cx="138240" cy="126360"/>
           </a:xfrm>
           <a:prstGeom prst="rtTriangle">
             <a:avLst/>
@@ -15069,7 +15080,7 @@
         <p:spPr>
           <a:xfrm>
             <a:off x="3916080" y="2883240"/>
-            <a:ext cx="138600" cy="126720"/>
+            <a:ext cx="138240" cy="126360"/>
           </a:xfrm>
           <a:prstGeom prst="rtTriangle">
             <a:avLst/>
@@ -15105,7 +15116,7 @@
         <p:spPr>
           <a:xfrm>
             <a:off x="1547640" y="2883240"/>
-            <a:ext cx="2366640" cy="824760"/>
+            <a:ext cx="2366280" cy="824400"/>
           </a:xfrm>
           <a:prstGeom prst="rect">
             <a:avLst/>
@@ -15176,8 +15187,8 @@
         </p:nvSpPr>
         <p:spPr>
           <a:xfrm flipV="1">
-            <a:off x="3916080" y="4745880"/>
-            <a:ext cx="138600" cy="126720"/>
+            <a:off x="3916080" y="4745160"/>
+            <a:ext cx="138240" cy="126360"/>
           </a:xfrm>
           <a:prstGeom prst="rtTriangle">
             <a:avLst/>
@@ -15213,7 +15224,7 @@
         <p:spPr>
           <a:xfrm>
             <a:off x="3916080" y="4051080"/>
-            <a:ext cx="138600" cy="124560"/>
+            <a:ext cx="138240" cy="124200"/>
           </a:xfrm>
           <a:prstGeom prst="rtTriangle">
             <a:avLst/>
@@ -15249,7 +15260,7 @@
         <p:spPr>
           <a:xfrm>
             <a:off x="1547640" y="4051080"/>
-            <a:ext cx="2366640" cy="822600"/>
+            <a:ext cx="2366280" cy="822240"/>
           </a:xfrm>
           <a:prstGeom prst="rect">
             <a:avLst/>
@@ -15320,8 +15331,8 @@
         </p:nvSpPr>
         <p:spPr>
           <a:xfrm flipV="1">
-            <a:off x="3916080" y="5913720"/>
-            <a:ext cx="138600" cy="126720"/>
+            <a:off x="3916080" y="5913000"/>
+            <a:ext cx="138240" cy="126360"/>
           </a:xfrm>
           <a:prstGeom prst="rtTriangle">
             <a:avLst/>
@@ -15357,7 +15368,7 @@
         <p:spPr>
           <a:xfrm>
             <a:off x="3916080" y="5217120"/>
-            <a:ext cx="138600" cy="126720"/>
+            <a:ext cx="138240" cy="126360"/>
           </a:xfrm>
           <a:prstGeom prst="rtTriangle">
             <a:avLst/>
@@ -15393,7 +15404,7 @@
         <p:spPr>
           <a:xfrm>
             <a:off x="1547640" y="5217120"/>
-            <a:ext cx="2366640" cy="824760"/>
+            <a:ext cx="2366280" cy="824400"/>
           </a:xfrm>
           <a:prstGeom prst="rect">
             <a:avLst/>
@@ -15465,7 +15476,7 @@
         <p:spPr>
           <a:xfrm>
             <a:off x="5724000" y="1661040"/>
-            <a:ext cx="5074920" cy="920520"/>
+            <a:ext cx="5074560" cy="920160"/>
           </a:xfrm>
           <a:prstGeom prst="rect">
             <a:avLst/>
@@ -15527,7 +15538,7 @@
         <p:spPr>
           <a:xfrm>
             <a:off x="5724000" y="2825280"/>
-            <a:ext cx="5074920" cy="936720"/>
+            <a:ext cx="5074560" cy="936360"/>
           </a:xfrm>
           <a:prstGeom prst="rect">
             <a:avLst/>
@@ -15553,7 +15564,7 @@
         <p:spPr>
           <a:xfrm>
             <a:off x="5724000" y="3999240"/>
-            <a:ext cx="5074920" cy="816480"/>
+            <a:ext cx="5074560" cy="816120"/>
           </a:xfrm>
           <a:prstGeom prst="rect">
             <a:avLst/>
@@ -15615,7 +15626,7 @@
         <p:spPr>
           <a:xfrm>
             <a:off x="5724000" y="4985280"/>
-            <a:ext cx="5074920" cy="1324440"/>
+            <a:ext cx="5074560" cy="1324080"/>
           </a:xfrm>
           <a:prstGeom prst="rect">
             <a:avLst/>
@@ -15677,7 +15688,7 @@
         <p:spPr>
           <a:xfrm>
             <a:off x="5724000" y="2833560"/>
-            <a:ext cx="5074920" cy="920520"/>
+            <a:ext cx="5074560" cy="920160"/>
           </a:xfrm>
           <a:prstGeom prst="rect">
             <a:avLst/>
@@ -15788,7 +15799,7 @@
         <p:spPr>
           <a:xfrm>
             <a:off x="0" y="0"/>
-            <a:ext cx="12190680" cy="3528000"/>
+            <a:ext cx="12190320" cy="3527640"/>
           </a:xfrm>
           <a:prstGeom prst="rect">
             <a:avLst/>
@@ -15828,7 +15839,7 @@
         <p:spPr>
           <a:xfrm>
             <a:off x="1066680" y="345960"/>
-            <a:ext cx="10056960" cy="5085720"/>
+            <a:ext cx="10056600" cy="5085360"/>
           </a:xfrm>
           <a:prstGeom prst="rect">
             <a:avLst/>
@@ -15847,7 +15858,7 @@
         <p:spPr>
           <a:xfrm>
             <a:off x="0" y="3522600"/>
-            <a:ext cx="12190680" cy="3333960"/>
+            <a:ext cx="12190320" cy="3333600"/>
           </a:xfrm>
           <a:prstGeom prst="rect">
             <a:avLst/>
@@ -15883,7 +15894,7 @@
         <p:spPr>
           <a:xfrm>
             <a:off x="3459600" y="1377360"/>
-            <a:ext cx="5155560" cy="1551600"/>
+            <a:ext cx="5155200" cy="1551240"/>
           </a:xfrm>
           <a:prstGeom prst="rect">
             <a:avLst/>
@@ -15945,7 +15956,7 @@
         <p:spPr>
           <a:xfrm>
             <a:off x="5222520" y="4392000"/>
-            <a:ext cx="1832400" cy="332640"/>
+            <a:ext cx="1832040" cy="332280"/>
           </a:xfrm>
           <a:prstGeom prst="rect">
             <a:avLst/>
@@ -15971,7 +15982,7 @@
         <p:spPr>
           <a:xfrm>
             <a:off x="-360" y="3462840"/>
-            <a:ext cx="12190680" cy="3528000"/>
+            <a:ext cx="12190320" cy="3527640"/>
           </a:xfrm>
           <a:prstGeom prst="rect">
             <a:avLst/>
@@ -16007,7 +16018,7 @@
         <p:spPr>
           <a:xfrm>
             <a:off x="3688200" y="3637440"/>
-            <a:ext cx="5155560" cy="1551600"/>
+            <a:ext cx="5155200" cy="1551240"/>
           </a:xfrm>
           <a:prstGeom prst="rect">
             <a:avLst/>
@@ -16121,7 +16132,7 @@
         <p:spPr>
           <a:xfrm>
             <a:off x="0" y="0"/>
-            <a:ext cx="12190680" cy="2335320"/>
+            <a:ext cx="12190320" cy="2334960"/>
           </a:xfrm>
           <a:prstGeom prst="rect">
             <a:avLst/>
@@ -16162,7 +16173,7 @@
         <p:spPr>
           <a:xfrm>
             <a:off x="1066680" y="345960"/>
-            <a:ext cx="10056960" cy="1936440"/>
+            <a:ext cx="10056600" cy="1936080"/>
           </a:xfrm>
           <a:prstGeom prst="rect">
             <a:avLst/>
@@ -16181,7 +16192,7 @@
         <p:spPr>
           <a:xfrm>
             <a:off x="0" y="2283840"/>
-            <a:ext cx="12190680" cy="4572720"/>
+            <a:ext cx="12190320" cy="4572360"/>
           </a:xfrm>
           <a:prstGeom prst="rect">
             <a:avLst/>
@@ -16217,7 +16228,7 @@
         <p:spPr>
           <a:xfrm>
             <a:off x="785160" y="391680"/>
-            <a:ext cx="2998440" cy="945720"/>
+            <a:ext cx="2998080" cy="945360"/>
           </a:xfrm>
           <a:prstGeom prst="rect">
             <a:avLst/>
@@ -16324,7 +16335,7 @@
         <p:spPr>
           <a:xfrm>
             <a:off x="1479600" y="3281760"/>
-            <a:ext cx="1130760" cy="1204920"/>
+            <a:ext cx="1130400" cy="1204560"/>
           </a:xfrm>
           <a:custGeom>
             <a:avLst/>
@@ -16458,7 +16469,7 @@
         <p:spPr>
           <a:xfrm>
             <a:off x="4179960" y="3281760"/>
-            <a:ext cx="1130760" cy="1204920"/>
+            <a:ext cx="1130400" cy="1204560"/>
           </a:xfrm>
           <a:custGeom>
             <a:avLst/>
@@ -16592,7 +16603,7 @@
         <p:spPr>
           <a:xfrm>
             <a:off x="6879960" y="3281760"/>
-            <a:ext cx="1130760" cy="1204920"/>
+            <a:ext cx="1130400" cy="1204560"/>
           </a:xfrm>
           <a:custGeom>
             <a:avLst/>
@@ -16726,7 +16737,7 @@
         <p:spPr>
           <a:xfrm>
             <a:off x="9580320" y="3281760"/>
-            <a:ext cx="1130760" cy="1204920"/>
+            <a:ext cx="1130400" cy="1204560"/>
           </a:xfrm>
           <a:custGeom>
             <a:avLst/>
@@ -16860,7 +16871,7 @@
         <p:spPr>
           <a:xfrm>
             <a:off x="941400" y="4760640"/>
-            <a:ext cx="2041560" cy="455040"/>
+            <a:ext cx="2041200" cy="454680"/>
           </a:xfrm>
           <a:prstGeom prst="rect">
             <a:avLst/>
@@ -16922,7 +16933,7 @@
         <p:spPr>
           <a:xfrm>
             <a:off x="3673800" y="4760640"/>
-            <a:ext cx="2078640" cy="454320"/>
+            <a:ext cx="2078280" cy="453960"/>
           </a:xfrm>
           <a:prstGeom prst="rect">
             <a:avLst/>
@@ -16984,7 +16995,7 @@
         <p:spPr>
           <a:xfrm>
             <a:off x="6407640" y="4760640"/>
-            <a:ext cx="2078640" cy="455040"/>
+            <a:ext cx="2078280" cy="454680"/>
           </a:xfrm>
           <a:prstGeom prst="rect">
             <a:avLst/>
@@ -17046,7 +17057,7 @@
         <p:spPr>
           <a:xfrm>
             <a:off x="9123480" y="4760640"/>
-            <a:ext cx="2078640" cy="455040"/>
+            <a:ext cx="2078280" cy="454680"/>
           </a:xfrm>
           <a:prstGeom prst="rect">
             <a:avLst/>
@@ -17157,7 +17168,7 @@
         <p:spPr>
           <a:xfrm>
             <a:off x="0" y="2462040"/>
-            <a:ext cx="12190680" cy="1894320"/>
+            <a:ext cx="12190320" cy="1893960"/>
           </a:xfrm>
           <a:prstGeom prst="rect">
             <a:avLst/>
@@ -17191,7 +17202,7 @@
         <p:spPr>
           <a:xfrm>
             <a:off x="3714120" y="2202480"/>
-            <a:ext cx="257040" cy="258120"/>
+            <a:ext cx="256680" cy="257760"/>
           </a:xfrm>
           <a:custGeom>
             <a:avLst/>
@@ -17244,7 +17255,7 @@
         <p:spPr>
           <a:xfrm flipV="1">
             <a:off x="510120" y="4356000"/>
-            <a:ext cx="262080" cy="263160"/>
+            <a:ext cx="261720" cy="262800"/>
           </a:xfrm>
           <a:custGeom>
             <a:avLst/>
@@ -17297,7 +17308,7 @@
         <p:spPr>
           <a:xfrm>
             <a:off x="639000" y="2203200"/>
-            <a:ext cx="3207960" cy="2411640"/>
+            <a:ext cx="3207600" cy="2411280"/>
           </a:xfrm>
           <a:prstGeom prst="parallelogram">
             <a:avLst>
@@ -17335,7 +17346,7 @@
         <p:spPr>
           <a:xfrm>
             <a:off x="1487520" y="2531520"/>
-            <a:ext cx="1761480" cy="1715040"/>
+            <a:ext cx="1761120" cy="1714680"/>
           </a:xfrm>
           <a:prstGeom prst="rect">
             <a:avLst/>
@@ -17397,7 +17408,7 @@
         <p:spPr>
           <a:xfrm>
             <a:off x="4446720" y="2957760"/>
-            <a:ext cx="6732360" cy="912960"/>
+            <a:ext cx="6732000" cy="912600"/>
           </a:xfrm>
           <a:prstGeom prst="rect">
             <a:avLst/>
@@ -17508,7 +17519,7 @@
         <p:spPr>
           <a:xfrm>
             <a:off x="0" y="205200"/>
-            <a:ext cx="12190680" cy="599400"/>
+            <a:ext cx="12190320" cy="599040"/>
           </a:xfrm>
           <a:prstGeom prst="rect">
             <a:avLst/>
@@ -17544,7 +17555,7 @@
         <p:spPr>
           <a:xfrm flipH="1">
             <a:off x="264960" y="806040"/>
-            <a:ext cx="310680" cy="87840"/>
+            <a:ext cx="310320" cy="87480"/>
           </a:xfrm>
           <a:custGeom>
             <a:avLst/>
@@ -17602,8 +17613,8 @@
         </p:nvSpPr>
         <p:spPr>
           <a:xfrm flipV="1">
-            <a:off x="1457280" y="114840"/>
-            <a:ext cx="310680" cy="87840"/>
+            <a:off x="1457280" y="114120"/>
+            <a:ext cx="310320" cy="87480"/>
           </a:xfrm>
           <a:custGeom>
             <a:avLst/>
@@ -17662,7 +17673,7 @@
         <p:spPr>
           <a:xfrm flipH="1">
             <a:off x="311040" y="116280"/>
-            <a:ext cx="1401480" cy="777960"/>
+            <a:ext cx="1401120" cy="777600"/>
           </a:xfrm>
           <a:prstGeom prst="parallelogram">
             <a:avLst>
@@ -17700,7 +17711,7 @@
         <p:spPr>
           <a:xfrm>
             <a:off x="302040" y="244080"/>
-            <a:ext cx="1322640" cy="515880"/>
+            <a:ext cx="1322280" cy="515520"/>
           </a:xfrm>
           <a:prstGeom prst="rect">
             <a:avLst/>
@@ -17762,7 +17773,7 @@
         <p:spPr>
           <a:xfrm>
             <a:off x="2002320" y="244080"/>
-            <a:ext cx="2893320" cy="515160"/>
+            <a:ext cx="2892960" cy="514800"/>
           </a:xfrm>
           <a:prstGeom prst="rect">
             <a:avLst/>
@@ -17787,7 +17798,7 @@
               </a:lnSpc>
             </a:pPr>
             <a:r>
-              <a:rPr b="0" lang="en-US" sz="2800" spc="290" strike="noStrike">
+              <a:rPr b="0" lang="en-US" sz="2800" spc="287" strike="noStrike">
                 <a:solidFill>
                   <a:srgbClr val="ffffff"/>
                 </a:solidFill>
@@ -17824,7 +17835,7 @@
         <p:spPr>
           <a:xfrm>
             <a:off x="1035360" y="2648160"/>
-            <a:ext cx="2939760" cy="2455560"/>
+            <a:ext cx="2939400" cy="2455200"/>
           </a:xfrm>
           <a:prstGeom prst="round2DiagRect">
             <a:avLst>
@@ -17957,7 +17968,7 @@
         <p:spPr>
           <a:xfrm>
             <a:off x="5236920" y="1711440"/>
-            <a:ext cx="3886920" cy="4066920"/>
+            <a:ext cx="3886560" cy="4066560"/>
           </a:xfrm>
           <a:prstGeom prst="rect">
             <a:avLst/>
@@ -17997,7 +18008,7 @@
         <p:spPr>
           <a:xfrm>
             <a:off x="5596920" y="1993680"/>
-            <a:ext cx="5736240" cy="515880"/>
+            <a:ext cx="5735880" cy="515520"/>
           </a:xfrm>
           <a:prstGeom prst="rect">
             <a:avLst/>
@@ -18023,7 +18034,7 @@
         <p:spPr>
           <a:xfrm>
             <a:off x="5004000" y="2044440"/>
-            <a:ext cx="464760" cy="488160"/>
+            <a:ext cx="464400" cy="487800"/>
           </a:xfrm>
           <a:prstGeom prst="rect">
             <a:avLst/>
@@ -18095,7 +18106,7 @@
         <p:spPr>
           <a:xfrm>
             <a:off x="5004000" y="3040920"/>
-            <a:ext cx="464760" cy="488160"/>
+            <a:ext cx="464400" cy="487800"/>
           </a:xfrm>
           <a:prstGeom prst="rect">
             <a:avLst/>
@@ -18167,7 +18178,7 @@
         <p:spPr>
           <a:xfrm>
             <a:off x="5586120" y="3941280"/>
-            <a:ext cx="5594760" cy="515880"/>
+            <a:ext cx="5594400" cy="515520"/>
           </a:xfrm>
           <a:prstGeom prst="rect">
             <a:avLst/>
@@ -18229,7 +18240,7 @@
         <p:spPr>
           <a:xfrm>
             <a:off x="5004000" y="3994920"/>
-            <a:ext cx="464760" cy="488160"/>
+            <a:ext cx="464400" cy="487800"/>
           </a:xfrm>
           <a:prstGeom prst="rect">
             <a:avLst/>
@@ -18301,7 +18312,7 @@
         <p:spPr>
           <a:xfrm>
             <a:off x="5596920" y="4823280"/>
-            <a:ext cx="5583960" cy="515880"/>
+            <a:ext cx="5583600" cy="515520"/>
           </a:xfrm>
           <a:prstGeom prst="rect">
             <a:avLst/>
@@ -18327,7 +18338,7 @@
         <p:spPr>
           <a:xfrm>
             <a:off x="5004000" y="4948920"/>
-            <a:ext cx="464760" cy="488160"/>
+            <a:ext cx="464400" cy="487800"/>
           </a:xfrm>
           <a:prstGeom prst="rect">
             <a:avLst/>
@@ -18399,7 +18410,7 @@
         <p:spPr>
           <a:xfrm>
             <a:off x="5586120" y="3941280"/>
-            <a:ext cx="5594760" cy="515880"/>
+            <a:ext cx="5594400" cy="515520"/>
           </a:xfrm>
           <a:prstGeom prst="rect">
             <a:avLst/>
@@ -18425,7 +18436,7 @@
         <p:spPr>
           <a:xfrm>
             <a:off x="5586120" y="3941280"/>
-            <a:ext cx="5594760" cy="515880"/>
+            <a:ext cx="5594400" cy="515520"/>
           </a:xfrm>
           <a:prstGeom prst="rect">
             <a:avLst/>
@@ -18451,7 +18462,7 @@
         <p:spPr>
           <a:xfrm>
             <a:off x="5616000" y="4896000"/>
-            <a:ext cx="5594760" cy="515880"/>
+            <a:ext cx="5594400" cy="515520"/>
           </a:xfrm>
           <a:prstGeom prst="rect">
             <a:avLst/>
@@ -18513,7 +18524,7 @@
         <p:spPr>
           <a:xfrm>
             <a:off x="5596920" y="1993680"/>
-            <a:ext cx="1600200" cy="551880"/>
+            <a:ext cx="1599840" cy="551520"/>
           </a:xfrm>
           <a:prstGeom prst="rect">
             <a:avLst/>
@@ -18575,7 +18586,7 @@
         <p:spPr>
           <a:xfrm>
             <a:off x="5599080" y="2975400"/>
-            <a:ext cx="1600200" cy="551880"/>
+            <a:ext cx="1599840" cy="551520"/>
           </a:xfrm>
           <a:prstGeom prst="rect">
             <a:avLst/>
@@ -18686,7 +18697,7 @@
         <p:spPr>
           <a:xfrm>
             <a:off x="0" y="205200"/>
-            <a:ext cx="12190680" cy="599400"/>
+            <a:ext cx="12190320" cy="599040"/>
           </a:xfrm>
           <a:prstGeom prst="rect">
             <a:avLst/>
@@ -18722,7 +18733,7 @@
         <p:spPr>
           <a:xfrm flipH="1">
             <a:off x="264960" y="806040"/>
-            <a:ext cx="310680" cy="87840"/>
+            <a:ext cx="310320" cy="87480"/>
           </a:xfrm>
           <a:custGeom>
             <a:avLst/>
@@ -18780,8 +18791,8 @@
         </p:nvSpPr>
         <p:spPr>
           <a:xfrm flipV="1">
-            <a:off x="1457280" y="114840"/>
-            <a:ext cx="310680" cy="87840"/>
+            <a:off x="1457280" y="114120"/>
+            <a:ext cx="310320" cy="87480"/>
           </a:xfrm>
           <a:custGeom>
             <a:avLst/>
@@ -18840,7 +18851,7 @@
         <p:spPr>
           <a:xfrm flipH="1">
             <a:off x="311040" y="116280"/>
-            <a:ext cx="1401480" cy="777960"/>
+            <a:ext cx="1401120" cy="777600"/>
           </a:xfrm>
           <a:prstGeom prst="parallelogram">
             <a:avLst>
@@ -18878,7 +18889,7 @@
         <p:spPr>
           <a:xfrm>
             <a:off x="302040" y="244080"/>
-            <a:ext cx="1322640" cy="515880"/>
+            <a:ext cx="1322280" cy="515520"/>
           </a:xfrm>
           <a:prstGeom prst="rect">
             <a:avLst/>
@@ -18940,7 +18951,7 @@
         <p:spPr>
           <a:xfrm>
             <a:off x="2021400" y="244080"/>
-            <a:ext cx="2499840" cy="515160"/>
+            <a:ext cx="2499480" cy="514800"/>
           </a:xfrm>
           <a:prstGeom prst="rect">
             <a:avLst/>
@@ -18965,7 +18976,7 @@
               </a:lnSpc>
             </a:pPr>
             <a:r>
-              <a:rPr b="0" lang="en-US" sz="2800" spc="290" strike="noStrike">
+              <a:rPr b="0" lang="en-US" sz="2800" spc="287" strike="noStrike">
                 <a:solidFill>
                   <a:srgbClr val="ffffff"/>
                 </a:solidFill>
@@ -19002,7 +19013,7 @@
         <p:spPr>
           <a:xfrm>
             <a:off x="2649240" y="1383480"/>
-            <a:ext cx="7069680" cy="956880"/>
+            <a:ext cx="7069320" cy="956520"/>
           </a:xfrm>
           <a:prstGeom prst="rect">
             <a:avLst/>
@@ -19250,7 +19261,7 @@
         <p:spPr>
           <a:xfrm>
             <a:off x="1457640" y="1433880"/>
-            <a:ext cx="935640" cy="488160"/>
+            <a:ext cx="935280" cy="487800"/>
           </a:xfrm>
           <a:prstGeom prst="rect">
             <a:avLst/>
@@ -19322,7 +19333,7 @@
         <p:spPr>
           <a:xfrm>
             <a:off x="2638440" y="2715120"/>
-            <a:ext cx="7225920" cy="740520"/>
+            <a:ext cx="7225560" cy="740160"/>
           </a:xfrm>
           <a:prstGeom prst="rect">
             <a:avLst/>
@@ -19540,7 +19551,7 @@
         <p:spPr>
           <a:xfrm>
             <a:off x="1457640" y="2732760"/>
-            <a:ext cx="944280" cy="488160"/>
+            <a:ext cx="943920" cy="487800"/>
           </a:xfrm>
           <a:prstGeom prst="rect">
             <a:avLst/>
@@ -19612,7 +19623,7 @@
         <p:spPr>
           <a:xfrm>
             <a:off x="2638440" y="4006440"/>
-            <a:ext cx="7225920" cy="972000"/>
+            <a:ext cx="7225560" cy="971640"/>
           </a:xfrm>
           <a:prstGeom prst="rect">
             <a:avLst/>
@@ -19707,7 +19718,7 @@
         <p:spPr>
           <a:xfrm>
             <a:off x="1457640" y="4060080"/>
-            <a:ext cx="944280" cy="488160"/>
+            <a:ext cx="943920" cy="487800"/>
           </a:xfrm>
           <a:prstGeom prst="rect">
             <a:avLst/>
@@ -19820,7 +19831,7 @@
         <p:spPr>
           <a:xfrm>
             <a:off x="0" y="205200"/>
-            <a:ext cx="12190680" cy="599400"/>
+            <a:ext cx="12190320" cy="599040"/>
           </a:xfrm>
           <a:prstGeom prst="rect">
             <a:avLst/>
@@ -19856,7 +19867,7 @@
         <p:spPr>
           <a:xfrm flipH="1">
             <a:off x="264960" y="806040"/>
-            <a:ext cx="310680" cy="87840"/>
+            <a:ext cx="310320" cy="87480"/>
           </a:xfrm>
           <a:custGeom>
             <a:avLst/>
@@ -19914,8 +19925,8 @@
         </p:nvSpPr>
         <p:spPr>
           <a:xfrm flipV="1">
-            <a:off x="1457280" y="114840"/>
-            <a:ext cx="310680" cy="87840"/>
+            <a:off x="1457280" y="114120"/>
+            <a:ext cx="310320" cy="87480"/>
           </a:xfrm>
           <a:custGeom>
             <a:avLst/>
@@ -19974,7 +19985,7 @@
         <p:spPr>
           <a:xfrm flipH="1">
             <a:off x="311040" y="116280"/>
-            <a:ext cx="1401480" cy="777960"/>
+            <a:ext cx="1401120" cy="777600"/>
           </a:xfrm>
           <a:prstGeom prst="parallelogram">
             <a:avLst>
@@ -20012,7 +20023,7 @@
         <p:spPr>
           <a:xfrm>
             <a:off x="302040" y="244080"/>
-            <a:ext cx="1322640" cy="515880"/>
+            <a:ext cx="1322280" cy="515520"/>
           </a:xfrm>
           <a:prstGeom prst="rect">
             <a:avLst/>
@@ -20074,7 +20085,7 @@
         <p:spPr>
           <a:xfrm>
             <a:off x="2021400" y="244080"/>
-            <a:ext cx="2499840" cy="515160"/>
+            <a:ext cx="2499480" cy="514800"/>
           </a:xfrm>
           <a:prstGeom prst="rect">
             <a:avLst/>
@@ -20099,7 +20110,7 @@
               </a:lnSpc>
             </a:pPr>
             <a:r>
-              <a:rPr b="0" lang="en-US" sz="2800" spc="290" strike="noStrike">
+              <a:rPr b="0" lang="en-US" sz="2800" spc="287" strike="noStrike">
                 <a:solidFill>
                   <a:srgbClr val="ffffff"/>
                 </a:solidFill>
@@ -20135,7 +20146,7 @@
         </p:nvGraphicFramePr>
         <p:xfrm>
           <a:off x="1981080" y="1168560"/>
-          <a:ext cx="8228160" cy="4519800"/>
+          <a:ext cx="8227800" cy="4519440"/>
         </p:xfrm>
         <a:graphic>
           <a:graphicData uri="http://schemas.openxmlformats.org/drawingml/2006/chart">
@@ -20152,7 +20163,7 @@
         <p:spPr>
           <a:xfrm>
             <a:off x="4727520" y="1168560"/>
-            <a:ext cx="3998520" cy="515160"/>
+            <a:ext cx="3998160" cy="514800"/>
           </a:xfrm>
           <a:prstGeom prst="rect">
             <a:avLst/>
@@ -20265,7 +20276,7 @@
         <p:spPr>
           <a:xfrm>
             <a:off x="0" y="2462040"/>
-            <a:ext cx="12190680" cy="1894320"/>
+            <a:ext cx="12190320" cy="1893960"/>
           </a:xfrm>
           <a:prstGeom prst="rect">
             <a:avLst/>
@@ -20299,7 +20310,7 @@
         <p:spPr>
           <a:xfrm>
             <a:off x="3714120" y="2202480"/>
-            <a:ext cx="257040" cy="258120"/>
+            <a:ext cx="256680" cy="257760"/>
           </a:xfrm>
           <a:custGeom>
             <a:avLst/>
@@ -20352,7 +20363,7 @@
         <p:spPr>
           <a:xfrm flipV="1">
             <a:off x="510120" y="4356000"/>
-            <a:ext cx="262080" cy="263160"/>
+            <a:ext cx="261720" cy="262800"/>
           </a:xfrm>
           <a:custGeom>
             <a:avLst/>
@@ -20405,7 +20416,7 @@
         <p:spPr>
           <a:xfrm>
             <a:off x="639000" y="2203200"/>
-            <a:ext cx="3207960" cy="2411640"/>
+            <a:ext cx="3207600" cy="2411280"/>
           </a:xfrm>
           <a:prstGeom prst="parallelogram">
             <a:avLst>
@@ -20443,7 +20454,7 @@
         <p:spPr>
           <a:xfrm>
             <a:off x="1487520" y="2531520"/>
-            <a:ext cx="1761480" cy="1715040"/>
+            <a:ext cx="1761120" cy="1714680"/>
           </a:xfrm>
           <a:prstGeom prst="rect">
             <a:avLst/>
@@ -20505,7 +20516,7 @@
         <p:spPr>
           <a:xfrm>
             <a:off x="4446720" y="2928960"/>
-            <a:ext cx="6732360" cy="912960"/>
+            <a:ext cx="6732000" cy="912600"/>
           </a:xfrm>
           <a:prstGeom prst="rect">
             <a:avLst/>
@@ -20616,7 +20627,7 @@
         <p:spPr>
           <a:xfrm>
             <a:off x="0" y="205200"/>
-            <a:ext cx="12190680" cy="599400"/>
+            <a:ext cx="12190320" cy="599040"/>
           </a:xfrm>
           <a:prstGeom prst="rect">
             <a:avLst/>
@@ -20652,7 +20663,7 @@
         <p:spPr>
           <a:xfrm flipH="1">
             <a:off x="264960" y="806040"/>
-            <a:ext cx="310680" cy="87840"/>
+            <a:ext cx="310320" cy="87480"/>
           </a:xfrm>
           <a:custGeom>
             <a:avLst/>
@@ -20710,8 +20721,8 @@
         </p:nvSpPr>
         <p:spPr>
           <a:xfrm flipV="1">
-            <a:off x="1457280" y="114840"/>
-            <a:ext cx="310680" cy="87840"/>
+            <a:off x="1457280" y="114120"/>
+            <a:ext cx="310320" cy="87480"/>
           </a:xfrm>
           <a:custGeom>
             <a:avLst/>
@@ -20770,7 +20781,7 @@
         <p:spPr>
           <a:xfrm flipH="1">
             <a:off x="311040" y="116280"/>
-            <a:ext cx="1401480" cy="777960"/>
+            <a:ext cx="1401120" cy="777600"/>
           </a:xfrm>
           <a:prstGeom prst="parallelogram">
             <a:avLst>
@@ -20808,7 +20819,7 @@
         <p:spPr>
           <a:xfrm>
             <a:off x="302040" y="244080"/>
-            <a:ext cx="1322640" cy="515880"/>
+            <a:ext cx="1322280" cy="515520"/>
           </a:xfrm>
           <a:prstGeom prst="rect">
             <a:avLst/>
@@ -20870,7 +20881,7 @@
         <p:spPr>
           <a:xfrm>
             <a:off x="1964880" y="244080"/>
-            <a:ext cx="3679560" cy="515160"/>
+            <a:ext cx="3679200" cy="514800"/>
           </a:xfrm>
           <a:prstGeom prst="rect">
             <a:avLst/>
@@ -20895,7 +20906,7 @@
               </a:lnSpc>
             </a:pPr>
             <a:r>
-              <a:rPr b="0" lang="en-US" sz="2800" spc="290" strike="noStrike">
+              <a:rPr b="0" lang="en-US" sz="2800" spc="287" strike="noStrike">
                 <a:solidFill>
                   <a:srgbClr val="ffffff"/>
                 </a:solidFill>
@@ -20932,7 +20943,7 @@
         <p:spPr>
           <a:xfrm>
             <a:off x="8002080" y="4188600"/>
-            <a:ext cx="3407400" cy="1985760"/>
+            <a:ext cx="3407040" cy="1985400"/>
           </a:xfrm>
           <a:prstGeom prst="rect">
             <a:avLst/>
@@ -21007,7 +21018,7 @@
         <p:spPr>
           <a:xfrm>
             <a:off x="0" y="205200"/>
-            <a:ext cx="12190680" cy="599400"/>
+            <a:ext cx="12190320" cy="599040"/>
           </a:xfrm>
           <a:prstGeom prst="rect">
             <a:avLst/>
@@ -21043,7 +21054,7 @@
         <p:spPr>
           <a:xfrm flipH="1">
             <a:off x="264960" y="806040"/>
-            <a:ext cx="310680" cy="87840"/>
+            <a:ext cx="310320" cy="87480"/>
           </a:xfrm>
           <a:custGeom>
             <a:avLst/>
@@ -21101,8 +21112,8 @@
         </p:nvSpPr>
         <p:spPr>
           <a:xfrm flipV="1">
-            <a:off x="1457280" y="114840"/>
-            <a:ext cx="310680" cy="87840"/>
+            <a:off x="1457280" y="114120"/>
+            <a:ext cx="310320" cy="87480"/>
           </a:xfrm>
           <a:custGeom>
             <a:avLst/>
@@ -21161,7 +21172,7 @@
         <p:spPr>
           <a:xfrm flipH="1">
             <a:off x="311040" y="116280"/>
-            <a:ext cx="1401480" cy="777960"/>
+            <a:ext cx="1401120" cy="777600"/>
           </a:xfrm>
           <a:prstGeom prst="parallelogram">
             <a:avLst>
@@ -21199,7 +21210,7 @@
         <p:spPr>
           <a:xfrm>
             <a:off x="302040" y="244080"/>
-            <a:ext cx="1322640" cy="515880"/>
+            <a:ext cx="1322280" cy="515520"/>
           </a:xfrm>
           <a:prstGeom prst="rect">
             <a:avLst/>
@@ -21261,7 +21272,7 @@
         <p:spPr>
           <a:xfrm>
             <a:off x="2021400" y="244080"/>
-            <a:ext cx="2499840" cy="515160"/>
+            <a:ext cx="2499480" cy="514800"/>
           </a:xfrm>
           <a:prstGeom prst="rect">
             <a:avLst/>
@@ -21286,7 +21297,7 @@
               </a:lnSpc>
             </a:pPr>
             <a:r>
-              <a:rPr b="0" lang="en-US" sz="2800" spc="290" strike="noStrike">
+              <a:rPr b="0" lang="en-US" sz="2800" spc="287" strike="noStrike">
                 <a:solidFill>
                   <a:srgbClr val="ffffff"/>
                 </a:solidFill>
@@ -21323,7 +21334,7 @@
         <p:spPr>
           <a:xfrm>
             <a:off x="2963880" y="4393080"/>
-            <a:ext cx="2312280" cy="1984680"/>
+            <a:ext cx="2311920" cy="1984320"/>
           </a:xfrm>
           <a:custGeom>
             <a:avLst/>
@@ -21423,7 +21434,7 @@
         <p:spPr>
           <a:xfrm>
             <a:off x="4897800" y="3332160"/>
-            <a:ext cx="2312280" cy="1984680"/>
+            <a:ext cx="2311920" cy="1984320"/>
           </a:xfrm>
           <a:custGeom>
             <a:avLst/>
@@ -21490,7 +21501,7 @@
         <p:spPr>
           <a:xfrm>
             <a:off x="6879240" y="4389840"/>
-            <a:ext cx="2312280" cy="1984680"/>
+            <a:ext cx="2311920" cy="1984320"/>
           </a:xfrm>
           <a:prstGeom prst="hexagon">
             <a:avLst>
@@ -21565,7 +21576,7 @@
         <p:spPr>
           <a:xfrm>
             <a:off x="4868640" y="1190520"/>
-            <a:ext cx="2312280" cy="1984680"/>
+            <a:ext cx="2311920" cy="1984320"/>
           </a:xfrm>
           <a:prstGeom prst="hexagon">
             <a:avLst>
@@ -21640,7 +21651,7 @@
         <p:spPr>
           <a:xfrm>
             <a:off x="6818400" y="2272680"/>
-            <a:ext cx="2312280" cy="1984680"/>
+            <a:ext cx="2311920" cy="1984320"/>
           </a:xfrm>
           <a:prstGeom prst="hexagon">
             <a:avLst>
@@ -21715,7 +21726,7 @@
         <p:spPr>
           <a:xfrm>
             <a:off x="2882160" y="2305080"/>
-            <a:ext cx="2312280" cy="1984680"/>
+            <a:ext cx="2311920" cy="1984320"/>
           </a:xfrm>
           <a:custGeom>
             <a:avLst/>

</xml_diff>